<commit_message>
Added top doctor and top institutions analysis to the main analysis notebook
</commit_message>
<xml_diff>
--- a/2019-01-28 Webscraping project presentation (healthgrades physician reviews).pptx
+++ b/2019-01-28 Webscraping project presentation (healthgrades physician reviews).pptx
@@ -1176,7 +1176,7 @@
           <a:p>
             <a:fld id="{7A854366-437A-48A0-AD87-86B9458E7F30}" type="datetimeFigureOut">
               <a:rPr lang="en-US" smtClean="0"/>
-              <a:t>1/28/2019</a:t>
+              <a:t>1/29/2019</a:t>
             </a:fld>
             <a:endParaRPr lang="en-US"/>
           </a:p>
@@ -1911,6 +1911,258 @@
 </p:notes>
 </file>
 
+<file path=ppt/notesSlides/notesSlide6.xml><?xml version="1.0" encoding="utf-8"?>
+<p:notes xmlns:a="http://schemas.openxmlformats.org/drawingml/2006/main" xmlns:r="http://schemas.openxmlformats.org/officeDocument/2006/relationships" xmlns:p="http://schemas.openxmlformats.org/presentationml/2006/main">
+  <p:cSld>
+    <p:spTree>
+      <p:nvGrpSpPr>
+        <p:cNvPr id="1" name=""/>
+        <p:cNvGrpSpPr/>
+        <p:nvPr/>
+      </p:nvGrpSpPr>
+      <p:grpSpPr>
+        <a:xfrm>
+          <a:off x="0" y="0"/>
+          <a:ext cx="0" cy="0"/>
+          <a:chOff x="0" y="0"/>
+          <a:chExt cx="0" cy="0"/>
+        </a:xfrm>
+      </p:grpSpPr>
+      <p:sp>
+        <p:nvSpPr>
+          <p:cNvPr id="2" name="Slide Image Placeholder 1"/>
+          <p:cNvSpPr>
+            <a:spLocks noGrp="1" noRot="1" noChangeAspect="1"/>
+          </p:cNvSpPr>
+          <p:nvPr>
+            <p:ph type="sldImg"/>
+          </p:nvPr>
+        </p:nvSpPr>
+        <p:spPr/>
+      </p:sp>
+      <p:sp>
+        <p:nvSpPr>
+          <p:cNvPr id="3" name="Notes Placeholder 2"/>
+          <p:cNvSpPr>
+            <a:spLocks noGrp="1"/>
+          </p:cNvSpPr>
+          <p:nvPr>
+            <p:ph type="body" idx="1"/>
+          </p:nvPr>
+        </p:nvSpPr>
+        <p:spPr/>
+        <p:txBody>
+          <a:bodyPr/>
+          <a:lstStyle/>
+          <a:p>
+            <a:pPr marL="0" marR="0" lvl="0" indent="0" algn="l" defTabSz="914400" rtl="0" eaLnBrk="1" fontAlgn="auto" latinLnBrk="0" hangingPunct="1">
+              <a:lnSpc>
+                <a:spcPct val="100000"/>
+              </a:lnSpc>
+              <a:spcBef>
+                <a:spcPts val="0"/>
+              </a:spcBef>
+              <a:spcAft>
+                <a:spcPts val="0"/>
+              </a:spcAft>
+              <a:buClrTx/>
+              <a:buSzTx/>
+              <a:buFontTx/>
+              <a:buNone/>
+              <a:tabLst/>
+              <a:defRPr/>
+            </a:pPr>
+            <a:r>
+              <a:rPr lang="en-US" sz="1200" dirty="0"/>
+              <a:t>Doctor score – Staff score: </a:t>
+            </a:r>
+          </a:p>
+          <a:p>
+            <a:pPr marL="0" marR="0" lvl="0" indent="0" algn="l" defTabSz="914400" rtl="0" eaLnBrk="1" fontAlgn="auto" latinLnBrk="0" hangingPunct="1">
+              <a:lnSpc>
+                <a:spcPct val="100000"/>
+              </a:lnSpc>
+              <a:spcBef>
+                <a:spcPts val="0"/>
+              </a:spcBef>
+              <a:spcAft>
+                <a:spcPts val="0"/>
+              </a:spcAft>
+              <a:buClrTx/>
+              <a:buSzTx/>
+              <a:buFontTx/>
+              <a:buNone/>
+              <a:tabLst/>
+              <a:defRPr/>
+            </a:pPr>
+            <a:r>
+              <a:rPr lang="en-US" sz="1200" dirty="0"/>
+              <a:t>Mean 0 </a:t>
+            </a:r>
+          </a:p>
+          <a:p>
+            <a:pPr marL="0" marR="0" lvl="0" indent="0" algn="l" defTabSz="914400" rtl="0" eaLnBrk="1" fontAlgn="auto" latinLnBrk="0" hangingPunct="1">
+              <a:lnSpc>
+                <a:spcPct val="100000"/>
+              </a:lnSpc>
+              <a:spcBef>
+                <a:spcPts val="0"/>
+              </a:spcBef>
+              <a:spcAft>
+                <a:spcPts val="0"/>
+              </a:spcAft>
+              <a:buClrTx/>
+              <a:buSzTx/>
+              <a:buFontTx/>
+              <a:buNone/>
+              <a:tabLst/>
+              <a:defRPr/>
+            </a:pPr>
+            <a:r>
+              <a:rPr lang="en-US" sz="1200" dirty="0"/>
+              <a:t>Std: 0.4 </a:t>
+            </a:r>
+          </a:p>
+          <a:p>
+            <a:endParaRPr lang="en-US" dirty="0"/>
+          </a:p>
+        </p:txBody>
+      </p:sp>
+      <p:sp>
+        <p:nvSpPr>
+          <p:cNvPr id="4" name="Slide Number Placeholder 3"/>
+          <p:cNvSpPr>
+            <a:spLocks noGrp="1"/>
+          </p:cNvSpPr>
+          <p:nvPr>
+            <p:ph type="sldNum" sz="quarter" idx="5"/>
+          </p:nvPr>
+        </p:nvSpPr>
+        <p:spPr/>
+        <p:txBody>
+          <a:bodyPr/>
+          <a:lstStyle/>
+          <a:p>
+            <a:fld id="{1EA075B1-C92D-4901-8DCA-D1B14A8C9B6D}" type="slidenum">
+              <a:rPr lang="en-US" smtClean="0"/>
+              <a:t>16</a:t>
+            </a:fld>
+            <a:endParaRPr lang="en-US"/>
+          </a:p>
+        </p:txBody>
+      </p:sp>
+    </p:spTree>
+    <p:extLst>
+      <p:ext uri="{BB962C8B-B14F-4D97-AF65-F5344CB8AC3E}">
+        <p14:creationId xmlns:p14="http://schemas.microsoft.com/office/powerpoint/2010/main" val="1201601350"/>
+      </p:ext>
+    </p:extLst>
+  </p:cSld>
+  <p:clrMapOvr>
+    <a:masterClrMapping/>
+  </p:clrMapOvr>
+</p:notes>
+</file>
+
+<file path=ppt/notesSlides/notesSlide7.xml><?xml version="1.0" encoding="utf-8"?>
+<p:notes xmlns:a="http://schemas.openxmlformats.org/drawingml/2006/main" xmlns:r="http://schemas.openxmlformats.org/officeDocument/2006/relationships" xmlns:p="http://schemas.openxmlformats.org/presentationml/2006/main">
+  <p:cSld>
+    <p:spTree>
+      <p:nvGrpSpPr>
+        <p:cNvPr id="1" name=""/>
+        <p:cNvGrpSpPr/>
+        <p:nvPr/>
+      </p:nvGrpSpPr>
+      <p:grpSpPr>
+        <a:xfrm>
+          <a:off x="0" y="0"/>
+          <a:ext cx="0" cy="0"/>
+          <a:chOff x="0" y="0"/>
+          <a:chExt cx="0" cy="0"/>
+        </a:xfrm>
+      </p:grpSpPr>
+      <p:sp>
+        <p:nvSpPr>
+          <p:cNvPr id="2" name="Slide Image Placeholder 1"/>
+          <p:cNvSpPr>
+            <a:spLocks noGrp="1" noRot="1" noChangeAspect="1"/>
+          </p:cNvSpPr>
+          <p:nvPr>
+            <p:ph type="sldImg"/>
+          </p:nvPr>
+        </p:nvSpPr>
+        <p:spPr/>
+      </p:sp>
+      <p:sp>
+        <p:nvSpPr>
+          <p:cNvPr id="3" name="Notes Placeholder 2"/>
+          <p:cNvSpPr>
+            <a:spLocks noGrp="1"/>
+          </p:cNvSpPr>
+          <p:nvPr>
+            <p:ph type="body" idx="1"/>
+          </p:nvPr>
+        </p:nvSpPr>
+        <p:spPr/>
+        <p:txBody>
+          <a:bodyPr/>
+          <a:lstStyle/>
+          <a:p>
+            <a:r>
+              <a:rPr lang="en-US" dirty="0"/>
+              <a:t>Rating – doc score: distribution skewed to the negative side</a:t>
+            </a:r>
+          </a:p>
+          <a:p>
+            <a:r>
+              <a:rPr lang="en-US" dirty="0"/>
+              <a:t>Mean: -0.1 </a:t>
+            </a:r>
+          </a:p>
+          <a:p>
+            <a:r>
+              <a:rPr lang="en-US" dirty="0"/>
+              <a:t>Std: 0.23</a:t>
+            </a:r>
+          </a:p>
+        </p:txBody>
+      </p:sp>
+      <p:sp>
+        <p:nvSpPr>
+          <p:cNvPr id="4" name="Slide Number Placeholder 3"/>
+          <p:cNvSpPr>
+            <a:spLocks noGrp="1"/>
+          </p:cNvSpPr>
+          <p:nvPr>
+            <p:ph type="sldNum" sz="quarter" idx="5"/>
+          </p:nvPr>
+        </p:nvSpPr>
+        <p:spPr/>
+        <p:txBody>
+          <a:bodyPr/>
+          <a:lstStyle/>
+          <a:p>
+            <a:fld id="{1EA075B1-C92D-4901-8DCA-D1B14A8C9B6D}" type="slidenum">
+              <a:rPr lang="en-US" smtClean="0"/>
+              <a:t>17</a:t>
+            </a:fld>
+            <a:endParaRPr lang="en-US"/>
+          </a:p>
+        </p:txBody>
+      </p:sp>
+    </p:spTree>
+    <p:extLst>
+      <p:ext uri="{BB962C8B-B14F-4D97-AF65-F5344CB8AC3E}">
+        <p14:creationId xmlns:p14="http://schemas.microsoft.com/office/powerpoint/2010/main" val="3933745571"/>
+      </p:ext>
+    </p:extLst>
+  </p:cSld>
+  <p:clrMapOvr>
+    <a:masterClrMapping/>
+  </p:clrMapOvr>
+</p:notes>
+</file>
+
 <file path=ppt/slideLayouts/slideLayout1.xml><?xml version="1.0" encoding="utf-8"?>
 <p:sldLayout xmlns:a="http://schemas.openxmlformats.org/drawingml/2006/main" xmlns:r="http://schemas.openxmlformats.org/officeDocument/2006/relationships" xmlns:p="http://schemas.openxmlformats.org/presentationml/2006/main" type="title" preserve="1">
   <p:cSld name="Title Slide">
@@ -2097,7 +2349,7 @@
           <a:p>
             <a:fld id="{D3848E1C-89ED-4A9D-B82B-A79B27F37B5E}" type="datetime2">
               <a:rPr lang="en-US" smtClean="0"/>
-              <a:t>Monday, January 28, 2019</a:t>
+              <a:t>Tuesday, January 29, 2019</a:t>
             </a:fld>
             <a:endParaRPr lang="en-US"/>
           </a:p>
@@ -2315,7 +2567,7 @@
           <a:p>
             <a:fld id="{EEA0E15E-AC25-4311-A8BD-7236DC688F73}" type="datetime2">
               <a:rPr lang="en-US" smtClean="0"/>
-              <a:t>Monday, January 28, 2019</a:t>
+              <a:t>Tuesday, January 29, 2019</a:t>
             </a:fld>
             <a:endParaRPr lang="en-US"/>
           </a:p>
@@ -2468,7 +2720,7 @@
           <a:p>
             <a:fld id="{4ED1AA39-4B19-48F8-B7BC-C966F91EBDA3}" type="datetime2">
               <a:rPr lang="en-US" smtClean="0"/>
-              <a:t>Monday, January 28, 2019</a:t>
+              <a:t>Tuesday, January 29, 2019</a:t>
             </a:fld>
             <a:endParaRPr lang="en-US"/>
           </a:p>
@@ -2629,7 +2881,7 @@
           <a:p>
             <a:fld id="{FB2E9AD9-34C2-44BD-9E81-65687102272E}" type="datetime2">
               <a:rPr lang="en-US" smtClean="0"/>
-              <a:t>Monday, January 28, 2019</a:t>
+              <a:t>Tuesday, January 29, 2019</a:t>
             </a:fld>
             <a:endParaRPr lang="en-US"/>
           </a:p>
@@ -2985,7 +3237,7 @@
           <a:p>
             <a:fld id="{9FFD6704-699A-4F42-AB17-09919A402336}" type="datetime2">
               <a:rPr lang="en-US" smtClean="0"/>
-              <a:t>Monday, January 28, 2019</a:t>
+              <a:t>Tuesday, January 29, 2019</a:t>
             </a:fld>
             <a:endParaRPr lang="en-US"/>
           </a:p>
@@ -3284,7 +3536,7 @@
           <a:p>
             <a:fld id="{83AC6CCE-BB11-457A-A481-35C367855D71}" type="datetime2">
               <a:rPr lang="en-US" smtClean="0"/>
-              <a:t>Monday, January 28, 2019</a:t>
+              <a:t>Tuesday, January 29, 2019</a:t>
             </a:fld>
             <a:endParaRPr lang="en-US"/>
           </a:p>
@@ -3727,7 +3979,7 @@
           <a:p>
             <a:fld id="{9B2C3A35-E3B8-40D5-BD3D-673E6029BFB1}" type="datetime2">
               <a:rPr lang="en-US" smtClean="0"/>
-              <a:t>Monday, January 28, 2019</a:t>
+              <a:t>Tuesday, January 29, 2019</a:t>
             </a:fld>
             <a:endParaRPr lang="en-US"/>
           </a:p>
@@ -3858,7 +4110,7 @@
           <a:p>
             <a:fld id="{5E1356A2-4381-4485-A6ED-CCA92C47C082}" type="datetime2">
               <a:rPr lang="en-US" smtClean="0"/>
-              <a:t>Monday, January 28, 2019</a:t>
+              <a:t>Tuesday, January 29, 2019</a:t>
             </a:fld>
             <a:endParaRPr lang="en-US"/>
           </a:p>
@@ -4056,7 +4308,7 @@
           <a:p>
             <a:fld id="{0FFA9D5A-86CE-48AD-9CCA-EDE3D4A15468}" type="datetime2">
               <a:rPr lang="en-US" smtClean="0"/>
-              <a:t>Monday, January 28, 2019</a:t>
+              <a:t>Tuesday, January 29, 2019</a:t>
             </a:fld>
             <a:endParaRPr lang="en-US"/>
           </a:p>
@@ -4437,7 +4689,7 @@
           <a:p>
             <a:fld id="{3FB264F4-D3BA-4246-8F3D-E2E537469BF1}" type="datetime2">
               <a:rPr lang="en-US" smtClean="0"/>
-              <a:t>Monday, January 28, 2019</a:t>
+              <a:t>Tuesday, January 29, 2019</a:t>
             </a:fld>
             <a:endParaRPr lang="en-US"/>
           </a:p>
@@ -4720,7 +4972,7 @@
           <a:p>
             <a:fld id="{440379FA-2752-47BA-BB43-EBFA51A43CFC}" type="datetime2">
               <a:rPr lang="en-US" smtClean="0"/>
-              <a:t>Monday, January 28, 2019</a:t>
+              <a:t>Tuesday, January 29, 2019</a:t>
             </a:fld>
             <a:endParaRPr lang="en-US"/>
           </a:p>
@@ -4996,7 +5248,7 @@
           <a:p>
             <a:fld id="{1AAAB486-9B77-4865-A016-029732D93890}" type="datetime2">
               <a:rPr lang="en-US" smtClean="0"/>
-              <a:t>Monday, January 28, 2019</a:t>
+              <a:t>Tuesday, January 29, 2019</a:t>
             </a:fld>
             <a:endParaRPr lang="en-US" dirty="0"/>
           </a:p>
@@ -10041,7 +10293,7 @@
           <p:nvPr/>
         </p:nvPicPr>
         <p:blipFill>
-          <a:blip r:embed="rId2"/>
+          <a:blip r:embed="rId3"/>
           <a:stretch>
             <a:fillRect/>
           </a:stretch>
@@ -10368,7 +10620,7 @@
           <p:nvPr>
             <p:extLst>
               <p:ext uri="{D42A27DB-BD31-4B8C-83A1-F6EECF244321}">
-                <p14:modId xmlns:p14="http://schemas.microsoft.com/office/powerpoint/2010/main" val="4220843808"/>
+                <p14:modId xmlns:p14="http://schemas.microsoft.com/office/powerpoint/2010/main" val="4224007922"/>
               </p:ext>
             </p:extLst>
           </p:nvPr>
@@ -10867,7 +11119,7 @@
           <p:nvPr/>
         </p:nvPicPr>
         <p:blipFill rotWithShape="1">
-          <a:blip r:embed="rId2"/>
+          <a:blip r:embed="rId3"/>
           <a:srcRect l="6272" b="5514"/>
           <a:stretch/>
         </p:blipFill>

</xml_diff>

<commit_message>
re-ordered a few slides
</commit_message>
<xml_diff>
--- a/2019-01-28 Webscraping project presentation (healthgrades physician reviews).pptx
+++ b/2019-01-28 Webscraping project presentation (healthgrades physician reviews).pptx
@@ -19,10 +19,10 @@
     <p:sldId id="265" r:id="rId10"/>
     <p:sldId id="266" r:id="rId11"/>
     <p:sldId id="268" r:id="rId12"/>
-    <p:sldId id="267" r:id="rId13"/>
-    <p:sldId id="271" r:id="rId14"/>
-    <p:sldId id="280" r:id="rId15"/>
-    <p:sldId id="273" r:id="rId16"/>
+    <p:sldId id="280" r:id="rId13"/>
+    <p:sldId id="273" r:id="rId14"/>
+    <p:sldId id="267" r:id="rId15"/>
+    <p:sldId id="271" r:id="rId16"/>
     <p:sldId id="274" r:id="rId17"/>
     <p:sldId id="275" r:id="rId18"/>
     <p:sldId id="277" r:id="rId19"/>
@@ -1180,7 +1180,7 @@
           <a:p>
             <a:fld id="{7A854366-437A-48A0-AD87-86B9458E7F30}" type="datetimeFigureOut">
               <a:rPr lang="en-US" smtClean="0"/>
-              <a:t>1/29/2019</a:t>
+              <a:t>1/30/2019</a:t>
             </a:fld>
             <a:endParaRPr lang="en-US"/>
           </a:p>
@@ -2116,16 +2116,76 @@
           <a:bodyPr/>
           <a:lstStyle/>
           <a:p>
-            <a:r>
-              <a:rPr lang="en-US" dirty="0"/>
-              <a:t>N for [30,40) = 17</a:t>
-            </a:r>
-          </a:p>
-          <a:p>
-            <a:r>
-              <a:rPr lang="en-US" dirty="0"/>
-              <a:t>Age does seem to have an impact on doctor’s rating for cardiologists (correlation = -0.15), </a:t>
-            </a:r>
+            <a:pPr marL="0" marR="0" lvl="0" indent="0" algn="l" defTabSz="914400" rtl="0" eaLnBrk="1" fontAlgn="auto" latinLnBrk="0" hangingPunct="1">
+              <a:lnSpc>
+                <a:spcPct val="100000"/>
+              </a:lnSpc>
+              <a:spcBef>
+                <a:spcPts val="0"/>
+              </a:spcBef>
+              <a:spcAft>
+                <a:spcPts val="0"/>
+              </a:spcAft>
+              <a:buClrTx/>
+              <a:buSzTx/>
+              <a:buFontTx/>
+              <a:buNone/>
+              <a:tabLst/>
+              <a:defRPr/>
+            </a:pPr>
+            <a:r>
+              <a:rPr lang="en-US" sz="1200" dirty="0"/>
+              <a:t>Doctor score – Staff score: </a:t>
+            </a:r>
+          </a:p>
+          <a:p>
+            <a:pPr marL="0" marR="0" lvl="0" indent="0" algn="l" defTabSz="914400" rtl="0" eaLnBrk="1" fontAlgn="auto" latinLnBrk="0" hangingPunct="1">
+              <a:lnSpc>
+                <a:spcPct val="100000"/>
+              </a:lnSpc>
+              <a:spcBef>
+                <a:spcPts val="0"/>
+              </a:spcBef>
+              <a:spcAft>
+                <a:spcPts val="0"/>
+              </a:spcAft>
+              <a:buClrTx/>
+              <a:buSzTx/>
+              <a:buFontTx/>
+              <a:buNone/>
+              <a:tabLst/>
+              <a:defRPr/>
+            </a:pPr>
+            <a:r>
+              <a:rPr lang="en-US" sz="1200" dirty="0"/>
+              <a:t>Mean 0 </a:t>
+            </a:r>
+          </a:p>
+          <a:p>
+            <a:pPr marL="0" marR="0" lvl="0" indent="0" algn="l" defTabSz="914400" rtl="0" eaLnBrk="1" fontAlgn="auto" latinLnBrk="0" hangingPunct="1">
+              <a:lnSpc>
+                <a:spcPct val="100000"/>
+              </a:lnSpc>
+              <a:spcBef>
+                <a:spcPts val="0"/>
+              </a:spcBef>
+              <a:spcAft>
+                <a:spcPts val="0"/>
+              </a:spcAft>
+              <a:buClrTx/>
+              <a:buSzTx/>
+              <a:buFontTx/>
+              <a:buNone/>
+              <a:tabLst/>
+              <a:defRPr/>
+            </a:pPr>
+            <a:r>
+              <a:rPr lang="en-US" sz="1200" dirty="0"/>
+              <a:t>Std: 0.4 </a:t>
+            </a:r>
+          </a:p>
+          <a:p>
+            <a:endParaRPr lang="en-US" dirty="0"/>
           </a:p>
         </p:txBody>
       </p:sp>
@@ -2155,7 +2215,7 @@
     </p:spTree>
     <p:extLst>
       <p:ext uri="{BB962C8B-B14F-4D97-AF65-F5344CB8AC3E}">
-        <p14:creationId xmlns:p14="http://schemas.microsoft.com/office/powerpoint/2010/main" val="845662542"/>
+        <p14:creationId xmlns:p14="http://schemas.microsoft.com/office/powerpoint/2010/main" val="474917449"/>
       </p:ext>
     </p:extLst>
   </p:cSld>
@@ -2211,19 +2271,19 @@
           <a:p>
             <a:r>
               <a:rPr lang="en-US" dirty="0"/>
-              <a:t>Same trend holds true for cardiologists both in terms of number of reviews and rating distribution</a:t>
+              <a:t>Rating – doc score: distribution skewed to the negative side</a:t>
             </a:r>
           </a:p>
           <a:p>
             <a:r>
               <a:rPr lang="en-US" dirty="0"/>
-              <a:t>GI mean Female: 4; Male: 8</a:t>
+              <a:t>Mean: -0.1 </a:t>
             </a:r>
           </a:p>
           <a:p>
             <a:r>
               <a:rPr lang="en-US" dirty="0"/>
-              <a:t>Cardio mean Female: 2.8; Male 5.3</a:t>
+              <a:t>Std: 0.23</a:t>
             </a:r>
           </a:p>
         </p:txBody>
@@ -2254,7 +2314,7 @@
     </p:spTree>
     <p:extLst>
       <p:ext uri="{BB962C8B-B14F-4D97-AF65-F5344CB8AC3E}">
-        <p14:creationId xmlns:p14="http://schemas.microsoft.com/office/powerpoint/2010/main" val="3755137529"/>
+        <p14:creationId xmlns:p14="http://schemas.microsoft.com/office/powerpoint/2010/main" val="3933745571"/>
       </p:ext>
     </p:extLst>
   </p:cSld>
@@ -2308,76 +2368,16 @@
           <a:bodyPr/>
           <a:lstStyle/>
           <a:p>
-            <a:pPr marL="0" marR="0" lvl="0" indent="0" algn="l" defTabSz="914400" rtl="0" eaLnBrk="1" fontAlgn="auto" latinLnBrk="0" hangingPunct="1">
-              <a:lnSpc>
-                <a:spcPct val="100000"/>
-              </a:lnSpc>
-              <a:spcBef>
-                <a:spcPts val="0"/>
-              </a:spcBef>
-              <a:spcAft>
-                <a:spcPts val="0"/>
-              </a:spcAft>
-              <a:buClrTx/>
-              <a:buSzTx/>
-              <a:buFontTx/>
-              <a:buNone/>
-              <a:tabLst/>
-              <a:defRPr/>
-            </a:pPr>
-            <a:r>
-              <a:rPr lang="en-US" sz="1200" dirty="0"/>
-              <a:t>Doctor score – Staff score: </a:t>
-            </a:r>
-          </a:p>
-          <a:p>
-            <a:pPr marL="0" marR="0" lvl="0" indent="0" algn="l" defTabSz="914400" rtl="0" eaLnBrk="1" fontAlgn="auto" latinLnBrk="0" hangingPunct="1">
-              <a:lnSpc>
-                <a:spcPct val="100000"/>
-              </a:lnSpc>
-              <a:spcBef>
-                <a:spcPts val="0"/>
-              </a:spcBef>
-              <a:spcAft>
-                <a:spcPts val="0"/>
-              </a:spcAft>
-              <a:buClrTx/>
-              <a:buSzTx/>
-              <a:buFontTx/>
-              <a:buNone/>
-              <a:tabLst/>
-              <a:defRPr/>
-            </a:pPr>
-            <a:r>
-              <a:rPr lang="en-US" sz="1200" dirty="0"/>
-              <a:t>Mean 0 </a:t>
-            </a:r>
-          </a:p>
-          <a:p>
-            <a:pPr marL="0" marR="0" lvl="0" indent="0" algn="l" defTabSz="914400" rtl="0" eaLnBrk="1" fontAlgn="auto" latinLnBrk="0" hangingPunct="1">
-              <a:lnSpc>
-                <a:spcPct val="100000"/>
-              </a:lnSpc>
-              <a:spcBef>
-                <a:spcPts val="0"/>
-              </a:spcBef>
-              <a:spcAft>
-                <a:spcPts val="0"/>
-              </a:spcAft>
-              <a:buClrTx/>
-              <a:buSzTx/>
-              <a:buFontTx/>
-              <a:buNone/>
-              <a:tabLst/>
-              <a:defRPr/>
-            </a:pPr>
-            <a:r>
-              <a:rPr lang="en-US" sz="1200" dirty="0"/>
-              <a:t>Std: 0.4 </a:t>
-            </a:r>
-          </a:p>
-          <a:p>
-            <a:endParaRPr lang="en-US" dirty="0"/>
+            <a:r>
+              <a:rPr lang="en-US" dirty="0"/>
+              <a:t>N for [30,40) = 17</a:t>
+            </a:r>
+          </a:p>
+          <a:p>
+            <a:r>
+              <a:rPr lang="en-US" dirty="0"/>
+              <a:t>Age does seem to have an impact on doctor’s rating for cardiologists (correlation = -0.15), </a:t>
+            </a:r>
           </a:p>
         </p:txBody>
       </p:sp>
@@ -2407,7 +2407,7 @@
     </p:spTree>
     <p:extLst>
       <p:ext uri="{BB962C8B-B14F-4D97-AF65-F5344CB8AC3E}">
-        <p14:creationId xmlns:p14="http://schemas.microsoft.com/office/powerpoint/2010/main" val="474917449"/>
+        <p14:creationId xmlns:p14="http://schemas.microsoft.com/office/powerpoint/2010/main" val="845662542"/>
       </p:ext>
     </p:extLst>
   </p:cSld>
@@ -2463,19 +2463,19 @@
           <a:p>
             <a:r>
               <a:rPr lang="en-US" dirty="0"/>
-              <a:t>Rating – doc score: distribution skewed to the negative side</a:t>
+              <a:t>Same trend holds true for cardiologists both in terms of number of reviews and rating distribution</a:t>
             </a:r>
           </a:p>
           <a:p>
             <a:r>
               <a:rPr lang="en-US" dirty="0"/>
-              <a:t>Mean: -0.1 </a:t>
+              <a:t>GI mean Female: 4; Male: 8</a:t>
             </a:r>
           </a:p>
           <a:p>
             <a:r>
               <a:rPr lang="en-US" dirty="0"/>
-              <a:t>Std: 0.23</a:t>
+              <a:t>Cardio mean Female: 2.8; Male 5.3</a:t>
             </a:r>
           </a:p>
         </p:txBody>
@@ -2506,7 +2506,7 @@
     </p:spTree>
     <p:extLst>
       <p:ext uri="{BB962C8B-B14F-4D97-AF65-F5344CB8AC3E}">
-        <p14:creationId xmlns:p14="http://schemas.microsoft.com/office/powerpoint/2010/main" val="3933745571"/>
+        <p14:creationId xmlns:p14="http://schemas.microsoft.com/office/powerpoint/2010/main" val="3755137529"/>
       </p:ext>
     </p:extLst>
   </p:cSld>
@@ -2702,7 +2702,7 @@
           <a:p>
             <a:fld id="{D3848E1C-89ED-4A9D-B82B-A79B27F37B5E}" type="datetime2">
               <a:rPr lang="en-US" smtClean="0"/>
-              <a:t>Tuesday, January 29, 2019</a:t>
+              <a:t>Wednesday, January 30, 2019</a:t>
             </a:fld>
             <a:endParaRPr lang="en-US"/>
           </a:p>
@@ -2920,7 +2920,7 @@
           <a:p>
             <a:fld id="{EEA0E15E-AC25-4311-A8BD-7236DC688F73}" type="datetime2">
               <a:rPr lang="en-US" smtClean="0"/>
-              <a:t>Tuesday, January 29, 2019</a:t>
+              <a:t>Wednesday, January 30, 2019</a:t>
             </a:fld>
             <a:endParaRPr lang="en-US"/>
           </a:p>
@@ -3073,7 +3073,7 @@
           <a:p>
             <a:fld id="{4ED1AA39-4B19-48F8-B7BC-C966F91EBDA3}" type="datetime2">
               <a:rPr lang="en-US" smtClean="0"/>
-              <a:t>Tuesday, January 29, 2019</a:t>
+              <a:t>Wednesday, January 30, 2019</a:t>
             </a:fld>
             <a:endParaRPr lang="en-US"/>
           </a:p>
@@ -3234,7 +3234,7 @@
           <a:p>
             <a:fld id="{FB2E9AD9-34C2-44BD-9E81-65687102272E}" type="datetime2">
               <a:rPr lang="en-US" smtClean="0"/>
-              <a:t>Tuesday, January 29, 2019</a:t>
+              <a:t>Wednesday, January 30, 2019</a:t>
             </a:fld>
             <a:endParaRPr lang="en-US"/>
           </a:p>
@@ -3590,7 +3590,7 @@
           <a:p>
             <a:fld id="{9FFD6704-699A-4F42-AB17-09919A402336}" type="datetime2">
               <a:rPr lang="en-US" smtClean="0"/>
-              <a:t>Tuesday, January 29, 2019</a:t>
+              <a:t>Wednesday, January 30, 2019</a:t>
             </a:fld>
             <a:endParaRPr lang="en-US"/>
           </a:p>
@@ -3889,7 +3889,7 @@
           <a:p>
             <a:fld id="{83AC6CCE-BB11-457A-A481-35C367855D71}" type="datetime2">
               <a:rPr lang="en-US" smtClean="0"/>
-              <a:t>Tuesday, January 29, 2019</a:t>
+              <a:t>Wednesday, January 30, 2019</a:t>
             </a:fld>
             <a:endParaRPr lang="en-US"/>
           </a:p>
@@ -4332,7 +4332,7 @@
           <a:p>
             <a:fld id="{9B2C3A35-E3B8-40D5-BD3D-673E6029BFB1}" type="datetime2">
               <a:rPr lang="en-US" smtClean="0"/>
-              <a:t>Tuesday, January 29, 2019</a:t>
+              <a:t>Wednesday, January 30, 2019</a:t>
             </a:fld>
             <a:endParaRPr lang="en-US"/>
           </a:p>
@@ -4463,7 +4463,7 @@
           <a:p>
             <a:fld id="{5E1356A2-4381-4485-A6ED-CCA92C47C082}" type="datetime2">
               <a:rPr lang="en-US" smtClean="0"/>
-              <a:t>Tuesday, January 29, 2019</a:t>
+              <a:t>Wednesday, January 30, 2019</a:t>
             </a:fld>
             <a:endParaRPr lang="en-US"/>
           </a:p>
@@ -4661,7 +4661,7 @@
           <a:p>
             <a:fld id="{0FFA9D5A-86CE-48AD-9CCA-EDE3D4A15468}" type="datetime2">
               <a:rPr lang="en-US" smtClean="0"/>
-              <a:t>Tuesday, January 29, 2019</a:t>
+              <a:t>Wednesday, January 30, 2019</a:t>
             </a:fld>
             <a:endParaRPr lang="en-US"/>
           </a:p>
@@ -5042,7 +5042,7 @@
           <a:p>
             <a:fld id="{3FB264F4-D3BA-4246-8F3D-E2E537469BF1}" type="datetime2">
               <a:rPr lang="en-US" smtClean="0"/>
-              <a:t>Tuesday, January 29, 2019</a:t>
+              <a:t>Wednesday, January 30, 2019</a:t>
             </a:fld>
             <a:endParaRPr lang="en-US"/>
           </a:p>
@@ -5325,7 +5325,7 @@
           <a:p>
             <a:fld id="{440379FA-2752-47BA-BB43-EBFA51A43CFC}" type="datetime2">
               <a:rPr lang="en-US" smtClean="0"/>
-              <a:t>Tuesday, January 29, 2019</a:t>
+              <a:t>Wednesday, January 30, 2019</a:t>
             </a:fld>
             <a:endParaRPr lang="en-US"/>
           </a:p>
@@ -5601,7 +5601,7 @@
           <a:p>
             <a:fld id="{1AAAB486-9B77-4865-A016-029732D93890}" type="datetime2">
               <a:rPr lang="en-US" smtClean="0"/>
-              <a:t>Tuesday, January 29, 2019</a:t>
+              <a:t>Wednesday, January 30, 2019</a:t>
             </a:fld>
             <a:endParaRPr lang="en-US" dirty="0"/>
           </a:p>
@@ -6048,9 +6048,18 @@
             </a:r>
           </a:p>
           <a:p>
-            <a:r>
-              <a:rPr lang="en-US" dirty="0"/>
-              <a:t>By Yan Qi</a:t>
+            <a:endParaRPr lang="en-US" sz="2000" dirty="0"/>
+          </a:p>
+          <a:p>
+            <a:r>
+              <a:rPr lang="en-US" sz="2000" dirty="0"/>
+              <a:t>Yan Qi</a:t>
+            </a:r>
+          </a:p>
+          <a:p>
+            <a:r>
+              <a:rPr lang="en-US" sz="2000" i="1" dirty="0"/>
+              <a:t>1/30/2017</a:t>
             </a:r>
           </a:p>
         </p:txBody>
@@ -6932,14 +6941,14 @@
           <p:nvPr>
             <p:extLst>
               <p:ext uri="{D42A27DB-BD31-4B8C-83A1-F6EECF244321}">
-                <p14:modId xmlns:p14="http://schemas.microsoft.com/office/powerpoint/2010/main" val="1133645994"/>
+                <p14:modId xmlns:p14="http://schemas.microsoft.com/office/powerpoint/2010/main" val="1735923281"/>
               </p:ext>
             </p:extLst>
           </p:nvPr>
         </p:nvGraphicFramePr>
         <p:xfrm>
           <a:off x="989370" y="2230447"/>
-          <a:ext cx="7057104" cy="2937879"/>
+          <a:ext cx="7057104" cy="3384640"/>
         </p:xfrm>
         <a:graphic>
           <a:graphicData uri="http://schemas.openxmlformats.org/drawingml/2006/table">
@@ -7345,6 +7354,338 @@
                           <a:solidFill>
                             <a:srgbClr val="000000"/>
                           </a:solidFill>
+                          <a:latin typeface="Arial"/>
+                        </a:rPr>
+                        <a:t>Doctor’s own performance vs. Staff Performance</a:t>
+                      </a:r>
+                    </a:p>
+                  </a:txBody>
+                  <a:tcPr marL="45720" marR="45720" anchor="ctr">
+                    <a:lnL w="12700" cap="flat" cmpd="sng" algn="ctr">
+                      <a:solidFill>
+                        <a:sysClr val="window" lastClr="FFFFFF">
+                          <a:lumMod val="50000"/>
+                        </a:sysClr>
+                      </a:solidFill>
+                      <a:prstDash val="solid"/>
+                      <a:round/>
+                      <a:headEnd type="none" w="med" len="med"/>
+                      <a:tailEnd type="none" w="med" len="med"/>
+                    </a:lnL>
+                    <a:lnR w="12700" cap="flat" cmpd="sng" algn="ctr">
+                      <a:solidFill>
+                        <a:sysClr val="window" lastClr="FFFFFF">
+                          <a:lumMod val="50000"/>
+                        </a:sysClr>
+                      </a:solidFill>
+                      <a:prstDash val="solid"/>
+                      <a:round/>
+                      <a:headEnd type="none" w="med" len="med"/>
+                      <a:tailEnd type="none" w="med" len="med"/>
+                    </a:lnR>
+                    <a:lnT w="12700" cap="flat" cmpd="sng" algn="ctr">
+                      <a:solidFill>
+                        <a:sysClr val="window" lastClr="FFFFFF">
+                          <a:lumMod val="50000"/>
+                        </a:sysClr>
+                      </a:solidFill>
+                      <a:prstDash val="solid"/>
+                      <a:round/>
+                      <a:headEnd type="none" w="med" len="med"/>
+                      <a:tailEnd type="none" w="med" len="med"/>
+                    </a:lnT>
+                    <a:lnB w="12700" cap="flat" cmpd="sng" algn="ctr">
+                      <a:solidFill>
+                        <a:sysClr val="window" lastClr="FFFFFF">
+                          <a:lumMod val="50000"/>
+                        </a:sysClr>
+                      </a:solidFill>
+                      <a:prstDash val="solid"/>
+                      <a:round/>
+                      <a:headEnd type="none" w="med" len="med"/>
+                      <a:tailEnd type="none" w="med" len="med"/>
+                    </a:lnB>
+                    <a:lnTlToBr w="12700" cmpd="sng">
+                      <a:noFill/>
+                      <a:prstDash val="solid"/>
+                    </a:lnTlToBr>
+                    <a:lnBlToTr w="12700" cmpd="sng">
+                      <a:noFill/>
+                      <a:prstDash val="solid"/>
+                    </a:lnBlToTr>
+                    <a:noFill/>
+                  </a:tcPr>
+                </a:tc>
+                <a:tc>
+                  <a:txBody>
+                    <a:bodyPr/>
+                    <a:lstStyle>
+                      <a:lvl1pPr marL="0" algn="l" defTabSz="914400" rtl="0" eaLnBrk="1" latinLnBrk="0" hangingPunct="1">
+                        <a:defRPr sz="1800" kern="1200">
+                          <a:solidFill>
+                            <a:schemeClr val="dk1"/>
+                          </a:solidFill>
+                          <a:latin typeface="Calibri"/>
+                        </a:defRPr>
+                      </a:lvl1pPr>
+                      <a:lvl2pPr marL="457200" algn="l" defTabSz="914400" rtl="0" eaLnBrk="1" latinLnBrk="0" hangingPunct="1">
+                        <a:defRPr sz="1800" kern="1200">
+                          <a:solidFill>
+                            <a:schemeClr val="dk1"/>
+                          </a:solidFill>
+                          <a:latin typeface="Calibri"/>
+                        </a:defRPr>
+                      </a:lvl2pPr>
+                      <a:lvl3pPr marL="914400" algn="l" defTabSz="914400" rtl="0" eaLnBrk="1" latinLnBrk="0" hangingPunct="1">
+                        <a:defRPr sz="1800" kern="1200">
+                          <a:solidFill>
+                            <a:schemeClr val="dk1"/>
+                          </a:solidFill>
+                          <a:latin typeface="Calibri"/>
+                        </a:defRPr>
+                      </a:lvl3pPr>
+                      <a:lvl4pPr marL="1371600" algn="l" defTabSz="914400" rtl="0" eaLnBrk="1" latinLnBrk="0" hangingPunct="1">
+                        <a:defRPr sz="1800" kern="1200">
+                          <a:solidFill>
+                            <a:schemeClr val="dk1"/>
+                          </a:solidFill>
+                          <a:latin typeface="Calibri"/>
+                        </a:defRPr>
+                      </a:lvl4pPr>
+                      <a:lvl5pPr marL="1828800" algn="l" defTabSz="914400" rtl="0" eaLnBrk="1" latinLnBrk="0" hangingPunct="1">
+                        <a:defRPr sz="1800" kern="1200">
+                          <a:solidFill>
+                            <a:schemeClr val="dk1"/>
+                          </a:solidFill>
+                          <a:latin typeface="Calibri"/>
+                        </a:defRPr>
+                      </a:lvl5pPr>
+                      <a:lvl6pPr marL="2286000" algn="l" defTabSz="914400" rtl="0" eaLnBrk="1" latinLnBrk="0" hangingPunct="1">
+                        <a:defRPr sz="1800" kern="1200">
+                          <a:solidFill>
+                            <a:schemeClr val="dk1"/>
+                          </a:solidFill>
+                          <a:latin typeface="Calibri"/>
+                        </a:defRPr>
+                      </a:lvl6pPr>
+                      <a:lvl7pPr marL="2743200" algn="l" defTabSz="914400" rtl="0" eaLnBrk="1" latinLnBrk="0" hangingPunct="1">
+                        <a:defRPr sz="1800" kern="1200">
+                          <a:solidFill>
+                            <a:schemeClr val="dk1"/>
+                          </a:solidFill>
+                          <a:latin typeface="Calibri"/>
+                        </a:defRPr>
+                      </a:lvl7pPr>
+                      <a:lvl8pPr marL="3200400" algn="l" defTabSz="914400" rtl="0" eaLnBrk="1" latinLnBrk="0" hangingPunct="1">
+                        <a:defRPr sz="1800" kern="1200">
+                          <a:solidFill>
+                            <a:schemeClr val="dk1"/>
+                          </a:solidFill>
+                          <a:latin typeface="Calibri"/>
+                        </a:defRPr>
+                      </a:lvl8pPr>
+                      <a:lvl9pPr marL="3657600" algn="l" defTabSz="914400" rtl="0" eaLnBrk="1" latinLnBrk="0" hangingPunct="1">
+                        <a:defRPr sz="1800" kern="1200">
+                          <a:solidFill>
+                            <a:schemeClr val="dk1"/>
+                          </a:solidFill>
+                          <a:latin typeface="Calibri"/>
+                        </a:defRPr>
+                      </a:lvl9pPr>
+                    </a:lstStyle>
+                    <a:p>
+                      <a:pPr marL="285750" indent="-285750" algn="l" fontAlgn="ctr">
+                        <a:buFont typeface="Arial" panose="020B0604020202020204" pitchFamily="34" charset="0"/>
+                        <a:buChar char="•"/>
+                      </a:pPr>
+                      <a:r>
+                        <a:rPr lang="en-US" sz="1600" b="0" i="1" u="none" strike="noStrike" dirty="0">
+                          <a:solidFill>
+                            <a:srgbClr val="000000"/>
+                          </a:solidFill>
+                          <a:latin typeface="Arial"/>
+                        </a:rPr>
+                        <a:t>How well do doc score and staff score correlate with overall rating?</a:t>
+                      </a:r>
+                    </a:p>
+                    <a:p>
+                      <a:pPr marL="285750" indent="-285750" algn="l" fontAlgn="ctr">
+                        <a:buFont typeface="Arial" panose="020B0604020202020204" pitchFamily="34" charset="0"/>
+                        <a:buChar char="•"/>
+                      </a:pPr>
+                      <a:r>
+                        <a:rPr lang="en-US" sz="1600" b="0" i="1" u="none" strike="noStrike" dirty="0">
+                          <a:solidFill>
+                            <a:srgbClr val="000000"/>
+                          </a:solidFill>
+                          <a:latin typeface="Arial"/>
+                        </a:rPr>
+                        <a:t>How well does doctor score correlate with staff score? </a:t>
+                      </a:r>
+                    </a:p>
+                    <a:p>
+                      <a:pPr marL="285750" indent="-285750" algn="l" fontAlgn="ctr">
+                        <a:buFont typeface="Arial" panose="020B0604020202020204" pitchFamily="34" charset="0"/>
+                        <a:buChar char="•"/>
+                      </a:pPr>
+                      <a:r>
+                        <a:rPr lang="en-US" sz="1600" b="0" i="1" u="none" strike="noStrike" dirty="0">
+                          <a:solidFill>
+                            <a:srgbClr val="000000"/>
+                          </a:solidFill>
+                          <a:latin typeface="Arial"/>
+                        </a:rPr>
+                        <a:t>What kind of impact does office staff’s performance have on the doctor’s overall rating?</a:t>
+                      </a:r>
+                    </a:p>
+                  </a:txBody>
+                  <a:tcPr marL="182880" marR="182880" marT="91440" marB="91440" anchor="ctr">
+                    <a:lnL w="12700" cap="flat" cmpd="sng" algn="ctr">
+                      <a:solidFill>
+                        <a:sysClr val="window" lastClr="FFFFFF">
+                          <a:lumMod val="50000"/>
+                        </a:sysClr>
+                      </a:solidFill>
+                      <a:prstDash val="solid"/>
+                      <a:round/>
+                      <a:headEnd type="none" w="med" len="med"/>
+                      <a:tailEnd type="none" w="med" len="med"/>
+                    </a:lnL>
+                    <a:lnR w="12700" cap="flat" cmpd="sng" algn="ctr">
+                      <a:solidFill>
+                        <a:sysClr val="window" lastClr="FFFFFF">
+                          <a:lumMod val="50000"/>
+                        </a:sysClr>
+                      </a:solidFill>
+                      <a:prstDash val="solid"/>
+                      <a:round/>
+                      <a:headEnd type="none" w="med" len="med"/>
+                      <a:tailEnd type="none" w="med" len="med"/>
+                    </a:lnR>
+                    <a:lnT w="12700" cap="flat" cmpd="sng" algn="ctr">
+                      <a:solidFill>
+                        <a:sysClr val="window" lastClr="FFFFFF">
+                          <a:lumMod val="50000"/>
+                        </a:sysClr>
+                      </a:solidFill>
+                      <a:prstDash val="solid"/>
+                      <a:round/>
+                      <a:headEnd type="none" w="med" len="med"/>
+                      <a:tailEnd type="none" w="med" len="med"/>
+                    </a:lnT>
+                    <a:lnB w="12700" cap="flat" cmpd="sng" algn="ctr">
+                      <a:solidFill>
+                        <a:sysClr val="window" lastClr="FFFFFF">
+                          <a:lumMod val="50000"/>
+                        </a:sysClr>
+                      </a:solidFill>
+                      <a:prstDash val="solid"/>
+                      <a:round/>
+                      <a:headEnd type="none" w="med" len="med"/>
+                      <a:tailEnd type="none" w="med" len="med"/>
+                    </a:lnB>
+                    <a:lnTlToBr w="12700" cmpd="sng">
+                      <a:noFill/>
+                      <a:prstDash val="solid"/>
+                    </a:lnTlToBr>
+                    <a:lnBlToTr w="12700" cmpd="sng">
+                      <a:noFill/>
+                      <a:prstDash val="solid"/>
+                    </a:lnBlToTr>
+                    <a:noFill/>
+                  </a:tcPr>
+                </a:tc>
+                <a:extLst>
+                  <a:ext uri="{0D108BD9-81ED-4DB2-BD59-A6C34878D82A}">
+                    <a16:rowId xmlns:a16="http://schemas.microsoft.com/office/drawing/2014/main" val="10001"/>
+                  </a:ext>
+                </a:extLst>
+              </a:tr>
+              <a:tr h="688704">
+                <a:tc>
+                  <a:txBody>
+                    <a:bodyPr/>
+                    <a:lstStyle>
+                      <a:lvl1pPr marL="0" algn="l" defTabSz="914400" rtl="0" eaLnBrk="1" latinLnBrk="0" hangingPunct="1">
+                        <a:defRPr sz="1800" kern="1200">
+                          <a:solidFill>
+                            <a:schemeClr val="dk1"/>
+                          </a:solidFill>
+                          <a:latin typeface="Calibri"/>
+                        </a:defRPr>
+                      </a:lvl1pPr>
+                      <a:lvl2pPr marL="457200" algn="l" defTabSz="914400" rtl="0" eaLnBrk="1" latinLnBrk="0" hangingPunct="1">
+                        <a:defRPr sz="1800" kern="1200">
+                          <a:solidFill>
+                            <a:schemeClr val="dk1"/>
+                          </a:solidFill>
+                          <a:latin typeface="Calibri"/>
+                        </a:defRPr>
+                      </a:lvl2pPr>
+                      <a:lvl3pPr marL="914400" algn="l" defTabSz="914400" rtl="0" eaLnBrk="1" latinLnBrk="0" hangingPunct="1">
+                        <a:defRPr sz="1800" kern="1200">
+                          <a:solidFill>
+                            <a:schemeClr val="dk1"/>
+                          </a:solidFill>
+                          <a:latin typeface="Calibri"/>
+                        </a:defRPr>
+                      </a:lvl3pPr>
+                      <a:lvl4pPr marL="1371600" algn="l" defTabSz="914400" rtl="0" eaLnBrk="1" latinLnBrk="0" hangingPunct="1">
+                        <a:defRPr sz="1800" kern="1200">
+                          <a:solidFill>
+                            <a:schemeClr val="dk1"/>
+                          </a:solidFill>
+                          <a:latin typeface="Calibri"/>
+                        </a:defRPr>
+                      </a:lvl4pPr>
+                      <a:lvl5pPr marL="1828800" algn="l" defTabSz="914400" rtl="0" eaLnBrk="1" latinLnBrk="0" hangingPunct="1">
+                        <a:defRPr sz="1800" kern="1200">
+                          <a:solidFill>
+                            <a:schemeClr val="dk1"/>
+                          </a:solidFill>
+                          <a:latin typeface="Calibri"/>
+                        </a:defRPr>
+                      </a:lvl5pPr>
+                      <a:lvl6pPr marL="2286000" algn="l" defTabSz="914400" rtl="0" eaLnBrk="1" latinLnBrk="0" hangingPunct="1">
+                        <a:defRPr sz="1800" kern="1200">
+                          <a:solidFill>
+                            <a:schemeClr val="dk1"/>
+                          </a:solidFill>
+                          <a:latin typeface="Calibri"/>
+                        </a:defRPr>
+                      </a:lvl6pPr>
+                      <a:lvl7pPr marL="2743200" algn="l" defTabSz="914400" rtl="0" eaLnBrk="1" latinLnBrk="0" hangingPunct="1">
+                        <a:defRPr sz="1800" kern="1200">
+                          <a:solidFill>
+                            <a:schemeClr val="dk1"/>
+                          </a:solidFill>
+                          <a:latin typeface="Calibri"/>
+                        </a:defRPr>
+                      </a:lvl7pPr>
+                      <a:lvl8pPr marL="3200400" algn="l" defTabSz="914400" rtl="0" eaLnBrk="1" latinLnBrk="0" hangingPunct="1">
+                        <a:defRPr sz="1800" kern="1200">
+                          <a:solidFill>
+                            <a:schemeClr val="dk1"/>
+                          </a:solidFill>
+                          <a:latin typeface="Calibri"/>
+                        </a:defRPr>
+                      </a:lvl8pPr>
+                      <a:lvl9pPr marL="3657600" algn="l" defTabSz="914400" rtl="0" eaLnBrk="1" latinLnBrk="0" hangingPunct="1">
+                        <a:defRPr sz="1800" kern="1200">
+                          <a:solidFill>
+                            <a:schemeClr val="dk1"/>
+                          </a:solidFill>
+                          <a:latin typeface="Calibri"/>
+                        </a:defRPr>
+                      </a:lvl9pPr>
+                    </a:lstStyle>
+                    <a:p>
+                      <a:pPr algn="ctr" fontAlgn="ctr"/>
+                      <a:r>
+                        <a:rPr lang="en-US" sz="1600" b="1" i="0" u="none" strike="noStrike" dirty="0">
+                          <a:solidFill>
+                            <a:srgbClr val="000000"/>
+                          </a:solidFill>
                           <a:latin typeface="+mn-lt"/>
                         </a:rPr>
                         <a:t>Age</a:t>
@@ -7561,11 +7902,11 @@
                 </a:tc>
                 <a:extLst>
                   <a:ext uri="{0D108BD9-81ED-4DB2-BD59-A6C34878D82A}">
-                    <a16:rowId xmlns:a16="http://schemas.microsoft.com/office/drawing/2014/main" val="10001"/>
+                    <a16:rowId xmlns:a16="http://schemas.microsoft.com/office/drawing/2014/main" val="10002"/>
                   </a:ext>
                 </a:extLst>
               </a:tr>
-              <a:tr h="688704">
+              <a:tr h="390087">
                 <a:tc>
                   <a:txBody>
                     <a:bodyPr/>
@@ -7860,323 +8201,6 @@
                 </a:tc>
                 <a:extLst>
                   <a:ext uri="{0D108BD9-81ED-4DB2-BD59-A6C34878D82A}">
-                    <a16:rowId xmlns:a16="http://schemas.microsoft.com/office/drawing/2014/main" val="10002"/>
-                  </a:ext>
-                </a:extLst>
-              </a:tr>
-              <a:tr h="390087">
-                <a:tc>
-                  <a:txBody>
-                    <a:bodyPr/>
-                    <a:lstStyle>
-                      <a:lvl1pPr marL="0" algn="l" defTabSz="914400" rtl="0" eaLnBrk="1" latinLnBrk="0" hangingPunct="1">
-                        <a:defRPr sz="1800" kern="1200">
-                          <a:solidFill>
-                            <a:schemeClr val="dk1"/>
-                          </a:solidFill>
-                          <a:latin typeface="Calibri"/>
-                        </a:defRPr>
-                      </a:lvl1pPr>
-                      <a:lvl2pPr marL="457200" algn="l" defTabSz="914400" rtl="0" eaLnBrk="1" latinLnBrk="0" hangingPunct="1">
-                        <a:defRPr sz="1800" kern="1200">
-                          <a:solidFill>
-                            <a:schemeClr val="dk1"/>
-                          </a:solidFill>
-                          <a:latin typeface="Calibri"/>
-                        </a:defRPr>
-                      </a:lvl2pPr>
-                      <a:lvl3pPr marL="914400" algn="l" defTabSz="914400" rtl="0" eaLnBrk="1" latinLnBrk="0" hangingPunct="1">
-                        <a:defRPr sz="1800" kern="1200">
-                          <a:solidFill>
-                            <a:schemeClr val="dk1"/>
-                          </a:solidFill>
-                          <a:latin typeface="Calibri"/>
-                        </a:defRPr>
-                      </a:lvl3pPr>
-                      <a:lvl4pPr marL="1371600" algn="l" defTabSz="914400" rtl="0" eaLnBrk="1" latinLnBrk="0" hangingPunct="1">
-                        <a:defRPr sz="1800" kern="1200">
-                          <a:solidFill>
-                            <a:schemeClr val="dk1"/>
-                          </a:solidFill>
-                          <a:latin typeface="Calibri"/>
-                        </a:defRPr>
-                      </a:lvl4pPr>
-                      <a:lvl5pPr marL="1828800" algn="l" defTabSz="914400" rtl="0" eaLnBrk="1" latinLnBrk="0" hangingPunct="1">
-                        <a:defRPr sz="1800" kern="1200">
-                          <a:solidFill>
-                            <a:schemeClr val="dk1"/>
-                          </a:solidFill>
-                          <a:latin typeface="Calibri"/>
-                        </a:defRPr>
-                      </a:lvl5pPr>
-                      <a:lvl6pPr marL="2286000" algn="l" defTabSz="914400" rtl="0" eaLnBrk="1" latinLnBrk="0" hangingPunct="1">
-                        <a:defRPr sz="1800" kern="1200">
-                          <a:solidFill>
-                            <a:schemeClr val="dk1"/>
-                          </a:solidFill>
-                          <a:latin typeface="Calibri"/>
-                        </a:defRPr>
-                      </a:lvl6pPr>
-                      <a:lvl7pPr marL="2743200" algn="l" defTabSz="914400" rtl="0" eaLnBrk="1" latinLnBrk="0" hangingPunct="1">
-                        <a:defRPr sz="1800" kern="1200">
-                          <a:solidFill>
-                            <a:schemeClr val="dk1"/>
-                          </a:solidFill>
-                          <a:latin typeface="Calibri"/>
-                        </a:defRPr>
-                      </a:lvl7pPr>
-                      <a:lvl8pPr marL="3200400" algn="l" defTabSz="914400" rtl="0" eaLnBrk="1" latinLnBrk="0" hangingPunct="1">
-                        <a:defRPr sz="1800" kern="1200">
-                          <a:solidFill>
-                            <a:schemeClr val="dk1"/>
-                          </a:solidFill>
-                          <a:latin typeface="Calibri"/>
-                        </a:defRPr>
-                      </a:lvl8pPr>
-                      <a:lvl9pPr marL="3657600" algn="l" defTabSz="914400" rtl="0" eaLnBrk="1" latinLnBrk="0" hangingPunct="1">
-                        <a:defRPr sz="1800" kern="1200">
-                          <a:solidFill>
-                            <a:schemeClr val="dk1"/>
-                          </a:solidFill>
-                          <a:latin typeface="Calibri"/>
-                        </a:defRPr>
-                      </a:lvl9pPr>
-                    </a:lstStyle>
-                    <a:p>
-                      <a:pPr algn="ctr" fontAlgn="ctr"/>
-                      <a:r>
-                        <a:rPr lang="en-US" sz="1600" b="1" i="0" u="none" strike="noStrike" dirty="0">
-                          <a:solidFill>
-                            <a:srgbClr val="000000"/>
-                          </a:solidFill>
-                          <a:latin typeface="Arial"/>
-                        </a:rPr>
-                        <a:t>Doctor’s own performance vs. Staff Performance</a:t>
-                      </a:r>
-                    </a:p>
-                  </a:txBody>
-                  <a:tcPr marL="45720" marR="45720" anchor="ctr">
-                    <a:lnL w="12700" cap="flat" cmpd="sng" algn="ctr">
-                      <a:solidFill>
-                        <a:sysClr val="window" lastClr="FFFFFF">
-                          <a:lumMod val="50000"/>
-                        </a:sysClr>
-                      </a:solidFill>
-                      <a:prstDash val="solid"/>
-                      <a:round/>
-                      <a:headEnd type="none" w="med" len="med"/>
-                      <a:tailEnd type="none" w="med" len="med"/>
-                    </a:lnL>
-                    <a:lnR w="12700" cap="flat" cmpd="sng" algn="ctr">
-                      <a:solidFill>
-                        <a:sysClr val="window" lastClr="FFFFFF">
-                          <a:lumMod val="50000"/>
-                        </a:sysClr>
-                      </a:solidFill>
-                      <a:prstDash val="solid"/>
-                      <a:round/>
-                      <a:headEnd type="none" w="med" len="med"/>
-                      <a:tailEnd type="none" w="med" len="med"/>
-                    </a:lnR>
-                    <a:lnT w="12700" cap="flat" cmpd="sng" algn="ctr">
-                      <a:solidFill>
-                        <a:sysClr val="window" lastClr="FFFFFF">
-                          <a:lumMod val="50000"/>
-                        </a:sysClr>
-                      </a:solidFill>
-                      <a:prstDash val="solid"/>
-                      <a:round/>
-                      <a:headEnd type="none" w="med" len="med"/>
-                      <a:tailEnd type="none" w="med" len="med"/>
-                    </a:lnT>
-                    <a:lnB w="12700" cap="flat" cmpd="sng" algn="ctr">
-                      <a:solidFill>
-                        <a:sysClr val="window" lastClr="FFFFFF">
-                          <a:lumMod val="50000"/>
-                        </a:sysClr>
-                      </a:solidFill>
-                      <a:prstDash val="solid"/>
-                      <a:round/>
-                      <a:headEnd type="none" w="med" len="med"/>
-                      <a:tailEnd type="none" w="med" len="med"/>
-                    </a:lnB>
-                    <a:lnTlToBr w="12700" cmpd="sng">
-                      <a:noFill/>
-                      <a:prstDash val="solid"/>
-                    </a:lnTlToBr>
-                    <a:lnBlToTr w="12700" cmpd="sng">
-                      <a:noFill/>
-                      <a:prstDash val="solid"/>
-                    </a:lnBlToTr>
-                    <a:noFill/>
-                  </a:tcPr>
-                </a:tc>
-                <a:tc>
-                  <a:txBody>
-                    <a:bodyPr/>
-                    <a:lstStyle>
-                      <a:lvl1pPr marL="0" algn="l" defTabSz="914400" rtl="0" eaLnBrk="1" latinLnBrk="0" hangingPunct="1">
-                        <a:defRPr sz="1800" kern="1200">
-                          <a:solidFill>
-                            <a:schemeClr val="dk1"/>
-                          </a:solidFill>
-                          <a:latin typeface="Calibri"/>
-                        </a:defRPr>
-                      </a:lvl1pPr>
-                      <a:lvl2pPr marL="457200" algn="l" defTabSz="914400" rtl="0" eaLnBrk="1" latinLnBrk="0" hangingPunct="1">
-                        <a:defRPr sz="1800" kern="1200">
-                          <a:solidFill>
-                            <a:schemeClr val="dk1"/>
-                          </a:solidFill>
-                          <a:latin typeface="Calibri"/>
-                        </a:defRPr>
-                      </a:lvl2pPr>
-                      <a:lvl3pPr marL="914400" algn="l" defTabSz="914400" rtl="0" eaLnBrk="1" latinLnBrk="0" hangingPunct="1">
-                        <a:defRPr sz="1800" kern="1200">
-                          <a:solidFill>
-                            <a:schemeClr val="dk1"/>
-                          </a:solidFill>
-                          <a:latin typeface="Calibri"/>
-                        </a:defRPr>
-                      </a:lvl3pPr>
-                      <a:lvl4pPr marL="1371600" algn="l" defTabSz="914400" rtl="0" eaLnBrk="1" latinLnBrk="0" hangingPunct="1">
-                        <a:defRPr sz="1800" kern="1200">
-                          <a:solidFill>
-                            <a:schemeClr val="dk1"/>
-                          </a:solidFill>
-                          <a:latin typeface="Calibri"/>
-                        </a:defRPr>
-                      </a:lvl4pPr>
-                      <a:lvl5pPr marL="1828800" algn="l" defTabSz="914400" rtl="0" eaLnBrk="1" latinLnBrk="0" hangingPunct="1">
-                        <a:defRPr sz="1800" kern="1200">
-                          <a:solidFill>
-                            <a:schemeClr val="dk1"/>
-                          </a:solidFill>
-                          <a:latin typeface="Calibri"/>
-                        </a:defRPr>
-                      </a:lvl5pPr>
-                      <a:lvl6pPr marL="2286000" algn="l" defTabSz="914400" rtl="0" eaLnBrk="1" latinLnBrk="0" hangingPunct="1">
-                        <a:defRPr sz="1800" kern="1200">
-                          <a:solidFill>
-                            <a:schemeClr val="dk1"/>
-                          </a:solidFill>
-                          <a:latin typeface="Calibri"/>
-                        </a:defRPr>
-                      </a:lvl6pPr>
-                      <a:lvl7pPr marL="2743200" algn="l" defTabSz="914400" rtl="0" eaLnBrk="1" latinLnBrk="0" hangingPunct="1">
-                        <a:defRPr sz="1800" kern="1200">
-                          <a:solidFill>
-                            <a:schemeClr val="dk1"/>
-                          </a:solidFill>
-                          <a:latin typeface="Calibri"/>
-                        </a:defRPr>
-                      </a:lvl7pPr>
-                      <a:lvl8pPr marL="3200400" algn="l" defTabSz="914400" rtl="0" eaLnBrk="1" latinLnBrk="0" hangingPunct="1">
-                        <a:defRPr sz="1800" kern="1200">
-                          <a:solidFill>
-                            <a:schemeClr val="dk1"/>
-                          </a:solidFill>
-                          <a:latin typeface="Calibri"/>
-                        </a:defRPr>
-                      </a:lvl8pPr>
-                      <a:lvl9pPr marL="3657600" algn="l" defTabSz="914400" rtl="0" eaLnBrk="1" latinLnBrk="0" hangingPunct="1">
-                        <a:defRPr sz="1800" kern="1200">
-                          <a:solidFill>
-                            <a:schemeClr val="dk1"/>
-                          </a:solidFill>
-                          <a:latin typeface="Calibri"/>
-                        </a:defRPr>
-                      </a:lvl9pPr>
-                    </a:lstStyle>
-                    <a:p>
-                      <a:pPr marL="285750" indent="-285750" algn="l" fontAlgn="ctr">
-                        <a:buFont typeface="Arial" panose="020B0604020202020204" pitchFamily="34" charset="0"/>
-                        <a:buChar char="•"/>
-                      </a:pPr>
-                      <a:r>
-                        <a:rPr lang="en-US" sz="1600" b="0" i="1" u="none" strike="noStrike" dirty="0">
-                          <a:solidFill>
-                            <a:srgbClr val="000000"/>
-                          </a:solidFill>
-                          <a:latin typeface="Arial"/>
-                        </a:rPr>
-                        <a:t>How well does doctor score correlate with staff score? </a:t>
-                      </a:r>
-                    </a:p>
-                    <a:p>
-                      <a:pPr marL="285750" indent="-285750" algn="l" fontAlgn="ctr">
-                        <a:buFont typeface="Arial" panose="020B0604020202020204" pitchFamily="34" charset="0"/>
-                        <a:buChar char="•"/>
-                      </a:pPr>
-                      <a:r>
-                        <a:rPr lang="en-US" sz="1600" b="0" i="1" u="none" strike="noStrike" dirty="0">
-                          <a:solidFill>
-                            <a:srgbClr val="000000"/>
-                          </a:solidFill>
-                          <a:latin typeface="Arial"/>
-                        </a:rPr>
-                        <a:t>What kind of impact does office staff’s performance have on the doctor’s overall rating?</a:t>
-                      </a:r>
-                    </a:p>
-                  </a:txBody>
-                  <a:tcPr marL="182880" marR="182880" marT="91440" marB="91440" anchor="ctr">
-                    <a:lnL w="12700" cap="flat" cmpd="sng" algn="ctr">
-                      <a:solidFill>
-                        <a:sysClr val="window" lastClr="FFFFFF">
-                          <a:lumMod val="50000"/>
-                        </a:sysClr>
-                      </a:solidFill>
-                      <a:prstDash val="solid"/>
-                      <a:round/>
-                      <a:headEnd type="none" w="med" len="med"/>
-                      <a:tailEnd type="none" w="med" len="med"/>
-                    </a:lnL>
-                    <a:lnR w="12700" cap="flat" cmpd="sng" algn="ctr">
-                      <a:solidFill>
-                        <a:sysClr val="window" lastClr="FFFFFF">
-                          <a:lumMod val="50000"/>
-                        </a:sysClr>
-                      </a:solidFill>
-                      <a:prstDash val="solid"/>
-                      <a:round/>
-                      <a:headEnd type="none" w="med" len="med"/>
-                      <a:tailEnd type="none" w="med" len="med"/>
-                    </a:lnR>
-                    <a:lnT w="12700" cap="flat" cmpd="sng" algn="ctr">
-                      <a:solidFill>
-                        <a:sysClr val="window" lastClr="FFFFFF">
-                          <a:lumMod val="50000"/>
-                        </a:sysClr>
-                      </a:solidFill>
-                      <a:prstDash val="solid"/>
-                      <a:round/>
-                      <a:headEnd type="none" w="med" len="med"/>
-                      <a:tailEnd type="none" w="med" len="med"/>
-                    </a:lnT>
-                    <a:lnB w="12700" cap="flat" cmpd="sng" algn="ctr">
-                      <a:solidFill>
-                        <a:sysClr val="window" lastClr="FFFFFF">
-                          <a:lumMod val="50000"/>
-                        </a:sysClr>
-                      </a:solidFill>
-                      <a:prstDash val="solid"/>
-                      <a:round/>
-                      <a:headEnd type="none" w="med" len="med"/>
-                      <a:tailEnd type="none" w="med" len="med"/>
-                    </a:lnB>
-                    <a:lnTlToBr w="12700" cmpd="sng">
-                      <a:noFill/>
-                      <a:prstDash val="solid"/>
-                    </a:lnTlToBr>
-                    <a:lnBlToTr w="12700" cmpd="sng">
-                      <a:noFill/>
-                      <a:prstDash val="solid"/>
-                    </a:lnBlToTr>
-                    <a:noFill/>
-                  </a:tcPr>
-                </a:tc>
-                <a:extLst>
-                  <a:ext uri="{0D108BD9-81ED-4DB2-BD59-A6C34878D82A}">
                     <a16:rowId xmlns:a16="http://schemas.microsoft.com/office/drawing/2014/main" val="10003"/>
                   </a:ext>
                 </a:extLst>
@@ -8199,583 +8223,6 @@
 </file>
 
 <file path=ppt/slides/slide12.xml><?xml version="1.0" encoding="utf-8"?>
-<p:sld xmlns:a="http://schemas.openxmlformats.org/drawingml/2006/main" xmlns:r="http://schemas.openxmlformats.org/officeDocument/2006/relationships" xmlns:p="http://schemas.openxmlformats.org/presentationml/2006/main">
-  <p:cSld>
-    <p:spTree>
-      <p:nvGrpSpPr>
-        <p:cNvPr id="1" name=""/>
-        <p:cNvGrpSpPr/>
-        <p:nvPr/>
-      </p:nvGrpSpPr>
-      <p:grpSpPr>
-        <a:xfrm>
-          <a:off x="0" y="0"/>
-          <a:ext cx="0" cy="0"/>
-          <a:chOff x="0" y="0"/>
-          <a:chExt cx="0" cy="0"/>
-        </a:xfrm>
-      </p:grpSpPr>
-      <p:sp>
-        <p:nvSpPr>
-          <p:cNvPr id="3" name="Title 2">
-            <a:extLst>
-              <a:ext uri="{FF2B5EF4-FFF2-40B4-BE49-F238E27FC236}">
-                <a16:creationId xmlns:a16="http://schemas.microsoft.com/office/drawing/2014/main" id="{FC45B0A3-9FD3-4759-A2DD-31967F31F038}"/>
-              </a:ext>
-            </a:extLst>
-          </p:cNvPr>
-          <p:cNvSpPr>
-            <a:spLocks noGrp="1"/>
-          </p:cNvSpPr>
-          <p:nvPr>
-            <p:ph type="title"/>
-          </p:nvPr>
-        </p:nvSpPr>
-        <p:spPr/>
-        <p:txBody>
-          <a:bodyPr>
-            <a:normAutofit fontScale="90000"/>
-          </a:bodyPr>
-          <a:lstStyle/>
-          <a:p>
-            <a:r>
-              <a:rPr lang="en-US" dirty="0"/>
-              <a:t>Surprisingly, more experienced doctors do not have a higher average rating than younger ones</a:t>
-            </a:r>
-          </a:p>
-        </p:txBody>
-      </p:sp>
-      <p:pic>
-        <p:nvPicPr>
-          <p:cNvPr id="4" name="Picture 3">
-            <a:extLst>
-              <a:ext uri="{FF2B5EF4-FFF2-40B4-BE49-F238E27FC236}">
-                <a16:creationId xmlns:a16="http://schemas.microsoft.com/office/drawing/2014/main" id="{D308AED2-A091-4199-90F5-7C8FA0AC054C}"/>
-              </a:ext>
-            </a:extLst>
-          </p:cNvPr>
-          <p:cNvPicPr>
-            <a:picLocks noChangeAspect="1"/>
-          </p:cNvPicPr>
-          <p:nvPr/>
-        </p:nvPicPr>
-        <p:blipFill>
-          <a:blip r:embed="rId3"/>
-          <a:stretch>
-            <a:fillRect/>
-          </a:stretch>
-        </p:blipFill>
-        <p:spPr>
-          <a:xfrm>
-            <a:off x="1258529" y="1944010"/>
-            <a:ext cx="6528619" cy="3926602"/>
-          </a:xfrm>
-          <a:prstGeom prst="rect">
-            <a:avLst/>
-          </a:prstGeom>
-        </p:spPr>
-      </p:pic>
-      <p:sp>
-        <p:nvSpPr>
-          <p:cNvPr id="5" name="TextBox 4">
-            <a:extLst>
-              <a:ext uri="{FF2B5EF4-FFF2-40B4-BE49-F238E27FC236}">
-                <a16:creationId xmlns:a16="http://schemas.microsoft.com/office/drawing/2014/main" id="{F222797D-5C5B-4E59-95CD-00BF4110F5B1}"/>
-              </a:ext>
-            </a:extLst>
-          </p:cNvPr>
-          <p:cNvSpPr txBox="1"/>
-          <p:nvPr/>
-        </p:nvSpPr>
-        <p:spPr>
-          <a:xfrm>
-            <a:off x="6299960" y="4488632"/>
-            <a:ext cx="1369201" cy="954107"/>
-          </a:xfrm>
-          <a:prstGeom prst="rect">
-            <a:avLst/>
-          </a:prstGeom>
-          <a:noFill/>
-          <a:ln>
-            <a:solidFill>
-              <a:schemeClr val="bg1">
-                <a:lumMod val="65000"/>
-              </a:schemeClr>
-            </a:solidFill>
-          </a:ln>
-        </p:spPr>
-        <p:txBody>
-          <a:bodyPr wrap="square" rtlCol="0">
-            <a:spAutoFit/>
-          </a:bodyPr>
-          <a:lstStyle/>
-          <a:p>
-            <a:pPr algn="ctr"/>
-            <a:r>
-              <a:rPr lang="en-US" sz="1400" i="1" dirty="0">
-                <a:latin typeface="Calibri" panose="020F0502020204030204" pitchFamily="34" charset="0"/>
-                <a:cs typeface="Calibri" panose="020F0502020204030204" pitchFamily="34" charset="0"/>
-              </a:rPr>
-              <a:t>N = </a:t>
-            </a:r>
-            <a:r>
-              <a:rPr lang="en-US" sz="1400" dirty="0">
-                <a:latin typeface="Calibri" panose="020F0502020204030204" pitchFamily="34" charset="0"/>
-                <a:cs typeface="Calibri" panose="020F0502020204030204" pitchFamily="34" charset="0"/>
-              </a:rPr>
-              <a:t>433 </a:t>
-            </a:r>
-          </a:p>
-          <a:p>
-            <a:pPr algn="ctr"/>
-            <a:r>
-              <a:rPr lang="en-US" sz="1400" dirty="0">
-                <a:latin typeface="Calibri" panose="020F0502020204030204" pitchFamily="34" charset="0"/>
-                <a:cs typeface="Calibri" panose="020F0502020204030204" pitchFamily="34" charset="0"/>
-              </a:rPr>
-              <a:t>doctors with age information and ≥ 5 reviews</a:t>
-            </a:r>
-          </a:p>
-        </p:txBody>
-      </p:sp>
-      <p:sp>
-        <p:nvSpPr>
-          <p:cNvPr id="6" name="TextBox 5">
-            <a:extLst>
-              <a:ext uri="{FF2B5EF4-FFF2-40B4-BE49-F238E27FC236}">
-                <a16:creationId xmlns:a16="http://schemas.microsoft.com/office/drawing/2014/main" id="{5102E82B-39BF-43E6-A761-A426CA92AFF4}"/>
-              </a:ext>
-            </a:extLst>
-          </p:cNvPr>
-          <p:cNvSpPr txBox="1"/>
-          <p:nvPr/>
-        </p:nvSpPr>
-        <p:spPr>
-          <a:xfrm>
-            <a:off x="1789471" y="5966158"/>
-            <a:ext cx="5933768" cy="523220"/>
-          </a:xfrm>
-          <a:prstGeom prst="rect">
-            <a:avLst/>
-          </a:prstGeom>
-          <a:noFill/>
-          <a:ln>
-            <a:solidFill>
-              <a:schemeClr val="bg1">
-                <a:lumMod val="65000"/>
-              </a:schemeClr>
-            </a:solidFill>
-          </a:ln>
-        </p:spPr>
-        <p:txBody>
-          <a:bodyPr wrap="square" rtlCol="0">
-            <a:spAutoFit/>
-          </a:bodyPr>
-          <a:lstStyle/>
-          <a:p>
-            <a:r>
-              <a:rPr lang="en-US" sz="1400" i="1" dirty="0">
-                <a:latin typeface="Calibri" panose="020F0502020204030204" pitchFamily="34" charset="0"/>
-                <a:cs typeface="Calibri" panose="020F0502020204030204" pitchFamily="34" charset="0"/>
-              </a:rPr>
-              <a:t>One way </a:t>
-            </a:r>
-            <a:r>
-              <a:rPr lang="en-US" sz="1400" i="1" dirty="0" err="1">
-                <a:latin typeface="Calibri" panose="020F0502020204030204" pitchFamily="34" charset="0"/>
-                <a:cs typeface="Calibri" panose="020F0502020204030204" pitchFamily="34" charset="0"/>
-              </a:rPr>
-              <a:t>anova</a:t>
-            </a:r>
-            <a:r>
-              <a:rPr lang="en-US" sz="1400" i="1" dirty="0">
-                <a:latin typeface="Calibri" panose="020F0502020204030204" pitchFamily="34" charset="0"/>
-                <a:cs typeface="Calibri" panose="020F0502020204030204" pitchFamily="34" charset="0"/>
-              </a:rPr>
-              <a:t> test shows there is no statistically significant difference between the group means</a:t>
-            </a:r>
-          </a:p>
-        </p:txBody>
-      </p:sp>
-    </p:spTree>
-    <p:extLst>
-      <p:ext uri="{BB962C8B-B14F-4D97-AF65-F5344CB8AC3E}">
-        <p14:creationId xmlns:p14="http://schemas.microsoft.com/office/powerpoint/2010/main" val="3717108525"/>
-      </p:ext>
-    </p:extLst>
-  </p:cSld>
-  <p:clrMapOvr>
-    <a:masterClrMapping/>
-  </p:clrMapOvr>
-</p:sld>
-</file>
-
-<file path=ppt/slides/slide13.xml><?xml version="1.0" encoding="utf-8"?>
-<p:sld xmlns:a="http://schemas.openxmlformats.org/drawingml/2006/main" xmlns:r="http://schemas.openxmlformats.org/officeDocument/2006/relationships" xmlns:p="http://schemas.openxmlformats.org/presentationml/2006/main">
-  <p:cSld>
-    <p:spTree>
-      <p:nvGrpSpPr>
-        <p:cNvPr id="1" name=""/>
-        <p:cNvGrpSpPr/>
-        <p:nvPr/>
-      </p:nvGrpSpPr>
-      <p:grpSpPr>
-        <a:xfrm>
-          <a:off x="0" y="0"/>
-          <a:ext cx="0" cy="0"/>
-          <a:chOff x="0" y="0"/>
-          <a:chExt cx="0" cy="0"/>
-        </a:xfrm>
-      </p:grpSpPr>
-      <p:sp>
-        <p:nvSpPr>
-          <p:cNvPr id="2" name="Title 1">
-            <a:extLst>
-              <a:ext uri="{FF2B5EF4-FFF2-40B4-BE49-F238E27FC236}">
-                <a16:creationId xmlns:a16="http://schemas.microsoft.com/office/drawing/2014/main" id="{F23C3C64-25B9-4E5E-AA31-1589FE83D806}"/>
-              </a:ext>
-            </a:extLst>
-          </p:cNvPr>
-          <p:cNvSpPr>
-            <a:spLocks noGrp="1"/>
-          </p:cNvSpPr>
-          <p:nvPr>
-            <p:ph type="title"/>
-          </p:nvPr>
-        </p:nvSpPr>
-        <p:spPr/>
-        <p:txBody>
-          <a:bodyPr>
-            <a:normAutofit fontScale="90000"/>
-          </a:bodyPr>
-          <a:lstStyle/>
-          <a:p>
-            <a:r>
-              <a:rPr lang="en-US" dirty="0"/>
-              <a:t>Number of reviews is biased by gender, but rating distribution is not</a:t>
-            </a:r>
-            <a:endParaRPr lang="en-US" sz="2400" dirty="0"/>
-          </a:p>
-        </p:txBody>
-      </p:sp>
-      <p:pic>
-        <p:nvPicPr>
-          <p:cNvPr id="9" name="Picture 8">
-            <a:extLst>
-              <a:ext uri="{FF2B5EF4-FFF2-40B4-BE49-F238E27FC236}">
-                <a16:creationId xmlns:a16="http://schemas.microsoft.com/office/drawing/2014/main" id="{30000D7F-9EC1-416A-92C8-B30554E0E8B1}"/>
-              </a:ext>
-            </a:extLst>
-          </p:cNvPr>
-          <p:cNvPicPr>
-            <a:picLocks noChangeAspect="1"/>
-          </p:cNvPicPr>
-          <p:nvPr/>
-        </p:nvPicPr>
-        <p:blipFill>
-          <a:blip r:embed="rId3"/>
-          <a:stretch>
-            <a:fillRect/>
-          </a:stretch>
-        </p:blipFill>
-        <p:spPr>
-          <a:xfrm>
-            <a:off x="578903" y="1740162"/>
-            <a:ext cx="3541826" cy="3943527"/>
-          </a:xfrm>
-          <a:prstGeom prst="rect">
-            <a:avLst/>
-          </a:prstGeom>
-        </p:spPr>
-      </p:pic>
-      <p:pic>
-        <p:nvPicPr>
-          <p:cNvPr id="10" name="Picture 9">
-            <a:extLst>
-              <a:ext uri="{FF2B5EF4-FFF2-40B4-BE49-F238E27FC236}">
-                <a16:creationId xmlns:a16="http://schemas.microsoft.com/office/drawing/2014/main" id="{549ECA3C-EEDB-4CA5-B991-9DB5A17B1CF6}"/>
-              </a:ext>
-            </a:extLst>
-          </p:cNvPr>
-          <p:cNvPicPr>
-            <a:picLocks noChangeAspect="1"/>
-          </p:cNvPicPr>
-          <p:nvPr/>
-        </p:nvPicPr>
-        <p:blipFill>
-          <a:blip r:embed="rId4"/>
-          <a:stretch>
-            <a:fillRect/>
-          </a:stretch>
-        </p:blipFill>
-        <p:spPr>
-          <a:xfrm>
-            <a:off x="4635910" y="1751811"/>
-            <a:ext cx="3557586" cy="3943527"/>
-          </a:xfrm>
-          <a:prstGeom prst="rect">
-            <a:avLst/>
-          </a:prstGeom>
-        </p:spPr>
-      </p:pic>
-      <p:sp>
-        <p:nvSpPr>
-          <p:cNvPr id="11" name="TextBox 10">
-            <a:extLst>
-              <a:ext uri="{FF2B5EF4-FFF2-40B4-BE49-F238E27FC236}">
-                <a16:creationId xmlns:a16="http://schemas.microsoft.com/office/drawing/2014/main" id="{B3282774-76AA-4258-943F-0B19D10A19D7}"/>
-              </a:ext>
-            </a:extLst>
-          </p:cNvPr>
-          <p:cNvSpPr txBox="1"/>
-          <p:nvPr/>
-        </p:nvSpPr>
-        <p:spPr>
-          <a:xfrm>
-            <a:off x="2274476" y="2443195"/>
-            <a:ext cx="1477541" cy="276999"/>
-          </a:xfrm>
-          <a:prstGeom prst="rect">
-            <a:avLst/>
-          </a:prstGeom>
-          <a:noFill/>
-          <a:ln>
-            <a:solidFill>
-              <a:schemeClr val="bg1">
-                <a:lumMod val="65000"/>
-              </a:schemeClr>
-            </a:solidFill>
-          </a:ln>
-        </p:spPr>
-        <p:txBody>
-          <a:bodyPr wrap="square" rtlCol="0">
-            <a:spAutoFit/>
-          </a:bodyPr>
-          <a:lstStyle/>
-          <a:p>
-            <a:r>
-              <a:rPr lang="en-US" sz="1200" i="1" dirty="0">
-                <a:latin typeface="Calibri" panose="020F0502020204030204" pitchFamily="34" charset="0"/>
-                <a:cs typeface="Calibri" panose="020F0502020204030204" pitchFamily="34" charset="0"/>
-              </a:rPr>
-              <a:t>N = </a:t>
-            </a:r>
-            <a:r>
-              <a:rPr lang="en-US" sz="1200" dirty="0">
-                <a:latin typeface="Calibri" panose="020F0502020204030204" pitchFamily="34" charset="0"/>
-                <a:cs typeface="Calibri" panose="020F0502020204030204" pitchFamily="34" charset="0"/>
-              </a:rPr>
-              <a:t>947 (all doctors)</a:t>
-            </a:r>
-          </a:p>
-        </p:txBody>
-      </p:sp>
-      <p:sp>
-        <p:nvSpPr>
-          <p:cNvPr id="12" name="TextBox 11">
-            <a:extLst>
-              <a:ext uri="{FF2B5EF4-FFF2-40B4-BE49-F238E27FC236}">
-                <a16:creationId xmlns:a16="http://schemas.microsoft.com/office/drawing/2014/main" id="{C004B274-2401-4F88-8E6A-8B27FE091D83}"/>
-              </a:ext>
-            </a:extLst>
-          </p:cNvPr>
-          <p:cNvSpPr txBox="1"/>
-          <p:nvPr/>
-        </p:nvSpPr>
-        <p:spPr>
-          <a:xfrm>
-            <a:off x="6010739" y="3467935"/>
-            <a:ext cx="1112734" cy="830997"/>
-          </a:xfrm>
-          <a:prstGeom prst="rect">
-            <a:avLst/>
-          </a:prstGeom>
-          <a:noFill/>
-          <a:ln>
-            <a:solidFill>
-              <a:schemeClr val="bg1">
-                <a:lumMod val="65000"/>
-              </a:schemeClr>
-            </a:solidFill>
-          </a:ln>
-        </p:spPr>
-        <p:txBody>
-          <a:bodyPr wrap="square" rtlCol="0">
-            <a:spAutoFit/>
-          </a:bodyPr>
-          <a:lstStyle/>
-          <a:p>
-            <a:r>
-              <a:rPr lang="en-US" sz="1200" i="1" dirty="0">
-                <a:latin typeface="Calibri" panose="020F0502020204030204" pitchFamily="34" charset="0"/>
-                <a:cs typeface="Calibri" panose="020F0502020204030204" pitchFamily="34" charset="0"/>
-              </a:rPr>
-              <a:t>N = </a:t>
-            </a:r>
-            <a:r>
-              <a:rPr lang="en-US" sz="1200" dirty="0">
-                <a:latin typeface="Calibri" panose="020F0502020204030204" pitchFamily="34" charset="0"/>
-                <a:cs typeface="Calibri" panose="020F0502020204030204" pitchFamily="34" charset="0"/>
-              </a:rPr>
-              <a:t>404 </a:t>
-            </a:r>
-          </a:p>
-          <a:p>
-            <a:r>
-              <a:rPr lang="en-US" sz="1200" dirty="0">
-                <a:latin typeface="Calibri" panose="020F0502020204030204" pitchFamily="34" charset="0"/>
-                <a:cs typeface="Calibri" panose="020F0502020204030204" pitchFamily="34" charset="0"/>
-              </a:rPr>
-              <a:t>(has gender info, and ≥ 5 reviews)</a:t>
-            </a:r>
-          </a:p>
-        </p:txBody>
-      </p:sp>
-      <p:sp>
-        <p:nvSpPr>
-          <p:cNvPr id="13" name="Rectangle 12">
-            <a:extLst>
-              <a:ext uri="{FF2B5EF4-FFF2-40B4-BE49-F238E27FC236}">
-                <a16:creationId xmlns:a16="http://schemas.microsoft.com/office/drawing/2014/main" id="{1F275EF3-B34B-425E-A630-470285785BB0}"/>
-              </a:ext>
-            </a:extLst>
-          </p:cNvPr>
-          <p:cNvSpPr/>
-          <p:nvPr/>
-        </p:nvSpPr>
-        <p:spPr bwMode="auto">
-          <a:xfrm>
-            <a:off x="1189703" y="5798799"/>
-            <a:ext cx="6784258" cy="702405"/>
-          </a:xfrm>
-          <a:prstGeom prst="rect">
-            <a:avLst/>
-          </a:prstGeom>
-          <a:gradFill rotWithShape="1">
-            <a:gsLst>
-              <a:gs pos="0">
-                <a:srgbClr val="FDD4AB">
-                  <a:tint val="50000"/>
-                  <a:satMod val="300000"/>
-                </a:srgbClr>
-              </a:gs>
-              <a:gs pos="35000">
-                <a:srgbClr val="FDD4AB">
-                  <a:tint val="37000"/>
-                  <a:satMod val="300000"/>
-                </a:srgbClr>
-              </a:gs>
-              <a:gs pos="100000">
-                <a:srgbClr val="FDD4AB">
-                  <a:tint val="15000"/>
-                  <a:satMod val="350000"/>
-                </a:srgbClr>
-              </a:gs>
-            </a:gsLst>
-            <a:lin ang="16200000" scaled="1"/>
-          </a:gradFill>
-          <a:ln w="9525" cap="flat" cmpd="sng" algn="ctr">
-            <a:solidFill>
-              <a:srgbClr val="FDD4AB">
-                <a:shade val="95000"/>
-                <a:satMod val="105000"/>
-              </a:srgbClr>
-            </a:solidFill>
-            <a:prstDash val="solid"/>
-          </a:ln>
-          <a:effectLst>
-            <a:outerShdw blurRad="40000" dist="20000" dir="5400000" rotWithShape="0">
-              <a:srgbClr val="000000">
-                <a:alpha val="38000"/>
-              </a:srgbClr>
-            </a:outerShdw>
-          </a:effectLst>
-        </p:spPr>
-        <p:txBody>
-          <a:bodyPr wrap="square" tIns="0" bIns="0" rtlCol="0">
-            <a:noAutofit/>
-          </a:bodyPr>
-          <a:lstStyle/>
-          <a:p>
-            <a:pPr marL="111125" lvl="0" indent="-111125">
-              <a:lnSpc>
-                <a:spcPct val="150000"/>
-              </a:lnSpc>
-              <a:buClr>
-                <a:srgbClr val="EC8026"/>
-              </a:buClr>
-              <a:buSzPct val="130000"/>
-              <a:buFont typeface="Arial" pitchFamily="34" charset="0"/>
-              <a:buChar char="•"/>
-              <a:defRPr/>
-            </a:pPr>
-            <a:r>
-              <a:rPr lang="en-US" sz="1300" kern="0" dirty="0">
-                <a:solidFill>
-                  <a:srgbClr val="000000"/>
-                </a:solidFill>
-                <a:ea typeface="ＭＳ Ｐゴシック" charset="-128"/>
-              </a:rPr>
-              <a:t>Female doctors tend to have fewer reviews than male doctors (p-</a:t>
-            </a:r>
-            <a:r>
-              <a:rPr lang="en-US" sz="1300" kern="0" dirty="0" err="1">
-                <a:solidFill>
-                  <a:srgbClr val="000000"/>
-                </a:solidFill>
-                <a:ea typeface="ＭＳ Ｐゴシック" charset="-128"/>
-              </a:rPr>
-              <a:t>val</a:t>
-            </a:r>
-            <a:r>
-              <a:rPr lang="en-US" sz="1300" kern="0" dirty="0">
-                <a:solidFill>
-                  <a:srgbClr val="000000"/>
-                </a:solidFill>
-                <a:ea typeface="ＭＳ Ｐゴシック" charset="-128"/>
-              </a:rPr>
-              <a:t> = 0.0002) </a:t>
-            </a:r>
-          </a:p>
-          <a:p>
-            <a:pPr marL="111125" lvl="0" indent="-111125">
-              <a:lnSpc>
-                <a:spcPct val="150000"/>
-              </a:lnSpc>
-              <a:buClr>
-                <a:srgbClr val="EC8026"/>
-              </a:buClr>
-              <a:buSzPct val="130000"/>
-              <a:buFont typeface="Arial" pitchFamily="34" charset="0"/>
-              <a:buChar char="•"/>
-              <a:defRPr/>
-            </a:pPr>
-            <a:r>
-              <a:rPr lang="en-US" sz="1300" kern="0" dirty="0">
-                <a:solidFill>
-                  <a:srgbClr val="000000"/>
-                </a:solidFill>
-                <a:ea typeface="ＭＳ Ｐゴシック" charset="-128"/>
-              </a:rPr>
-              <a:t>The doctors with &gt; 25 reviews are almost all male</a:t>
-            </a:r>
-          </a:p>
-        </p:txBody>
-      </p:sp>
-    </p:spTree>
-    <p:extLst>
-      <p:ext uri="{BB962C8B-B14F-4D97-AF65-F5344CB8AC3E}">
-        <p14:creationId xmlns:p14="http://schemas.microsoft.com/office/powerpoint/2010/main" val="3877481786"/>
-      </p:ext>
-    </p:extLst>
-  </p:cSld>
-  <p:clrMapOvr>
-    <a:masterClrMapping/>
-  </p:clrMapOvr>
-</p:sld>
-</file>
-
-<file path=ppt/slides/slide14.xml><?xml version="1.0" encoding="utf-8"?>
 <p:sld xmlns:a="http://schemas.openxmlformats.org/drawingml/2006/main" xmlns:r="http://schemas.openxmlformats.org/officeDocument/2006/relationships" xmlns:p="http://schemas.openxmlformats.org/presentationml/2006/main">
   <p:cSld>
     <p:spTree>
@@ -9641,7 +9088,7 @@
 </p:sld>
 </file>
 
-<file path=ppt/slides/slide15.xml><?xml version="1.0" encoding="utf-8"?>
+<file path=ppt/slides/slide13.xml><?xml version="1.0" encoding="utf-8"?>
 <p:sld xmlns:a="http://schemas.openxmlformats.org/drawingml/2006/main" xmlns:r="http://schemas.openxmlformats.org/officeDocument/2006/relationships" xmlns:p="http://schemas.openxmlformats.org/presentationml/2006/main">
   <p:cSld>
     <p:spTree>
@@ -10752,6 +10199,583 @@
 </p:sld>
 </file>
 
+<file path=ppt/slides/slide14.xml><?xml version="1.0" encoding="utf-8"?>
+<p:sld xmlns:a="http://schemas.openxmlformats.org/drawingml/2006/main" xmlns:r="http://schemas.openxmlformats.org/officeDocument/2006/relationships" xmlns:p="http://schemas.openxmlformats.org/presentationml/2006/main">
+  <p:cSld>
+    <p:spTree>
+      <p:nvGrpSpPr>
+        <p:cNvPr id="1" name=""/>
+        <p:cNvGrpSpPr/>
+        <p:nvPr/>
+      </p:nvGrpSpPr>
+      <p:grpSpPr>
+        <a:xfrm>
+          <a:off x="0" y="0"/>
+          <a:ext cx="0" cy="0"/>
+          <a:chOff x="0" y="0"/>
+          <a:chExt cx="0" cy="0"/>
+        </a:xfrm>
+      </p:grpSpPr>
+      <p:sp>
+        <p:nvSpPr>
+          <p:cNvPr id="3" name="Title 2">
+            <a:extLst>
+              <a:ext uri="{FF2B5EF4-FFF2-40B4-BE49-F238E27FC236}">
+                <a16:creationId xmlns:a16="http://schemas.microsoft.com/office/drawing/2014/main" id="{FC45B0A3-9FD3-4759-A2DD-31967F31F038}"/>
+              </a:ext>
+            </a:extLst>
+          </p:cNvPr>
+          <p:cNvSpPr>
+            <a:spLocks noGrp="1"/>
+          </p:cNvSpPr>
+          <p:nvPr>
+            <p:ph type="title"/>
+          </p:nvPr>
+        </p:nvSpPr>
+        <p:spPr/>
+        <p:txBody>
+          <a:bodyPr>
+            <a:normAutofit fontScale="90000"/>
+          </a:bodyPr>
+          <a:lstStyle/>
+          <a:p>
+            <a:r>
+              <a:rPr lang="en-US" dirty="0"/>
+              <a:t>Surprisingly, more experienced doctors do not have a higher average rating than younger ones</a:t>
+            </a:r>
+          </a:p>
+        </p:txBody>
+      </p:sp>
+      <p:pic>
+        <p:nvPicPr>
+          <p:cNvPr id="4" name="Picture 3">
+            <a:extLst>
+              <a:ext uri="{FF2B5EF4-FFF2-40B4-BE49-F238E27FC236}">
+                <a16:creationId xmlns:a16="http://schemas.microsoft.com/office/drawing/2014/main" id="{D308AED2-A091-4199-90F5-7C8FA0AC054C}"/>
+              </a:ext>
+            </a:extLst>
+          </p:cNvPr>
+          <p:cNvPicPr>
+            <a:picLocks noChangeAspect="1"/>
+          </p:cNvPicPr>
+          <p:nvPr/>
+        </p:nvPicPr>
+        <p:blipFill>
+          <a:blip r:embed="rId3"/>
+          <a:stretch>
+            <a:fillRect/>
+          </a:stretch>
+        </p:blipFill>
+        <p:spPr>
+          <a:xfrm>
+            <a:off x="1258529" y="1944010"/>
+            <a:ext cx="6528619" cy="3926602"/>
+          </a:xfrm>
+          <a:prstGeom prst="rect">
+            <a:avLst/>
+          </a:prstGeom>
+        </p:spPr>
+      </p:pic>
+      <p:sp>
+        <p:nvSpPr>
+          <p:cNvPr id="5" name="TextBox 4">
+            <a:extLst>
+              <a:ext uri="{FF2B5EF4-FFF2-40B4-BE49-F238E27FC236}">
+                <a16:creationId xmlns:a16="http://schemas.microsoft.com/office/drawing/2014/main" id="{F222797D-5C5B-4E59-95CD-00BF4110F5B1}"/>
+              </a:ext>
+            </a:extLst>
+          </p:cNvPr>
+          <p:cNvSpPr txBox="1"/>
+          <p:nvPr/>
+        </p:nvSpPr>
+        <p:spPr>
+          <a:xfrm>
+            <a:off x="6299960" y="4488632"/>
+            <a:ext cx="1369201" cy="954107"/>
+          </a:xfrm>
+          <a:prstGeom prst="rect">
+            <a:avLst/>
+          </a:prstGeom>
+          <a:noFill/>
+          <a:ln>
+            <a:solidFill>
+              <a:schemeClr val="bg1">
+                <a:lumMod val="65000"/>
+              </a:schemeClr>
+            </a:solidFill>
+          </a:ln>
+        </p:spPr>
+        <p:txBody>
+          <a:bodyPr wrap="square" rtlCol="0">
+            <a:spAutoFit/>
+          </a:bodyPr>
+          <a:lstStyle/>
+          <a:p>
+            <a:pPr algn="ctr"/>
+            <a:r>
+              <a:rPr lang="en-US" sz="1400" i="1" dirty="0">
+                <a:latin typeface="Calibri" panose="020F0502020204030204" pitchFamily="34" charset="0"/>
+                <a:cs typeface="Calibri" panose="020F0502020204030204" pitchFamily="34" charset="0"/>
+              </a:rPr>
+              <a:t>N = </a:t>
+            </a:r>
+            <a:r>
+              <a:rPr lang="en-US" sz="1400" dirty="0">
+                <a:latin typeface="Calibri" panose="020F0502020204030204" pitchFamily="34" charset="0"/>
+                <a:cs typeface="Calibri" panose="020F0502020204030204" pitchFamily="34" charset="0"/>
+              </a:rPr>
+              <a:t>433 </a:t>
+            </a:r>
+          </a:p>
+          <a:p>
+            <a:pPr algn="ctr"/>
+            <a:r>
+              <a:rPr lang="en-US" sz="1400" dirty="0">
+                <a:latin typeface="Calibri" panose="020F0502020204030204" pitchFamily="34" charset="0"/>
+                <a:cs typeface="Calibri" panose="020F0502020204030204" pitchFamily="34" charset="0"/>
+              </a:rPr>
+              <a:t>doctors with age information and ≥ 5 reviews</a:t>
+            </a:r>
+          </a:p>
+        </p:txBody>
+      </p:sp>
+      <p:sp>
+        <p:nvSpPr>
+          <p:cNvPr id="6" name="TextBox 5">
+            <a:extLst>
+              <a:ext uri="{FF2B5EF4-FFF2-40B4-BE49-F238E27FC236}">
+                <a16:creationId xmlns:a16="http://schemas.microsoft.com/office/drawing/2014/main" id="{5102E82B-39BF-43E6-A761-A426CA92AFF4}"/>
+              </a:ext>
+            </a:extLst>
+          </p:cNvPr>
+          <p:cNvSpPr txBox="1"/>
+          <p:nvPr/>
+        </p:nvSpPr>
+        <p:spPr>
+          <a:xfrm>
+            <a:off x="1789471" y="5966158"/>
+            <a:ext cx="5933768" cy="523220"/>
+          </a:xfrm>
+          <a:prstGeom prst="rect">
+            <a:avLst/>
+          </a:prstGeom>
+          <a:noFill/>
+          <a:ln>
+            <a:solidFill>
+              <a:schemeClr val="bg1">
+                <a:lumMod val="65000"/>
+              </a:schemeClr>
+            </a:solidFill>
+          </a:ln>
+        </p:spPr>
+        <p:txBody>
+          <a:bodyPr wrap="square" rtlCol="0">
+            <a:spAutoFit/>
+          </a:bodyPr>
+          <a:lstStyle/>
+          <a:p>
+            <a:r>
+              <a:rPr lang="en-US" sz="1400" i="1" dirty="0">
+                <a:latin typeface="Calibri" panose="020F0502020204030204" pitchFamily="34" charset="0"/>
+                <a:cs typeface="Calibri" panose="020F0502020204030204" pitchFamily="34" charset="0"/>
+              </a:rPr>
+              <a:t>One way </a:t>
+            </a:r>
+            <a:r>
+              <a:rPr lang="en-US" sz="1400" i="1" dirty="0" err="1">
+                <a:latin typeface="Calibri" panose="020F0502020204030204" pitchFamily="34" charset="0"/>
+                <a:cs typeface="Calibri" panose="020F0502020204030204" pitchFamily="34" charset="0"/>
+              </a:rPr>
+              <a:t>anova</a:t>
+            </a:r>
+            <a:r>
+              <a:rPr lang="en-US" sz="1400" i="1" dirty="0">
+                <a:latin typeface="Calibri" panose="020F0502020204030204" pitchFamily="34" charset="0"/>
+                <a:cs typeface="Calibri" panose="020F0502020204030204" pitchFamily="34" charset="0"/>
+              </a:rPr>
+              <a:t> test shows there is no statistically significant difference between the group means</a:t>
+            </a:r>
+          </a:p>
+        </p:txBody>
+      </p:sp>
+    </p:spTree>
+    <p:extLst>
+      <p:ext uri="{BB962C8B-B14F-4D97-AF65-F5344CB8AC3E}">
+        <p14:creationId xmlns:p14="http://schemas.microsoft.com/office/powerpoint/2010/main" val="3717108525"/>
+      </p:ext>
+    </p:extLst>
+  </p:cSld>
+  <p:clrMapOvr>
+    <a:masterClrMapping/>
+  </p:clrMapOvr>
+</p:sld>
+</file>
+
+<file path=ppt/slides/slide15.xml><?xml version="1.0" encoding="utf-8"?>
+<p:sld xmlns:a="http://schemas.openxmlformats.org/drawingml/2006/main" xmlns:r="http://schemas.openxmlformats.org/officeDocument/2006/relationships" xmlns:p="http://schemas.openxmlformats.org/presentationml/2006/main">
+  <p:cSld>
+    <p:spTree>
+      <p:nvGrpSpPr>
+        <p:cNvPr id="1" name=""/>
+        <p:cNvGrpSpPr/>
+        <p:nvPr/>
+      </p:nvGrpSpPr>
+      <p:grpSpPr>
+        <a:xfrm>
+          <a:off x="0" y="0"/>
+          <a:ext cx="0" cy="0"/>
+          <a:chOff x="0" y="0"/>
+          <a:chExt cx="0" cy="0"/>
+        </a:xfrm>
+      </p:grpSpPr>
+      <p:sp>
+        <p:nvSpPr>
+          <p:cNvPr id="2" name="Title 1">
+            <a:extLst>
+              <a:ext uri="{FF2B5EF4-FFF2-40B4-BE49-F238E27FC236}">
+                <a16:creationId xmlns:a16="http://schemas.microsoft.com/office/drawing/2014/main" id="{F23C3C64-25B9-4E5E-AA31-1589FE83D806}"/>
+              </a:ext>
+            </a:extLst>
+          </p:cNvPr>
+          <p:cNvSpPr>
+            <a:spLocks noGrp="1"/>
+          </p:cNvSpPr>
+          <p:nvPr>
+            <p:ph type="title"/>
+          </p:nvPr>
+        </p:nvSpPr>
+        <p:spPr/>
+        <p:txBody>
+          <a:bodyPr>
+            <a:normAutofit fontScale="90000"/>
+          </a:bodyPr>
+          <a:lstStyle/>
+          <a:p>
+            <a:r>
+              <a:rPr lang="en-US" dirty="0"/>
+              <a:t>Number of reviews is biased by gender, but rating distribution is not</a:t>
+            </a:r>
+            <a:endParaRPr lang="en-US" sz="2400" dirty="0"/>
+          </a:p>
+        </p:txBody>
+      </p:sp>
+      <p:pic>
+        <p:nvPicPr>
+          <p:cNvPr id="9" name="Picture 8">
+            <a:extLst>
+              <a:ext uri="{FF2B5EF4-FFF2-40B4-BE49-F238E27FC236}">
+                <a16:creationId xmlns:a16="http://schemas.microsoft.com/office/drawing/2014/main" id="{30000D7F-9EC1-416A-92C8-B30554E0E8B1}"/>
+              </a:ext>
+            </a:extLst>
+          </p:cNvPr>
+          <p:cNvPicPr>
+            <a:picLocks noChangeAspect="1"/>
+          </p:cNvPicPr>
+          <p:nvPr/>
+        </p:nvPicPr>
+        <p:blipFill>
+          <a:blip r:embed="rId3"/>
+          <a:stretch>
+            <a:fillRect/>
+          </a:stretch>
+        </p:blipFill>
+        <p:spPr>
+          <a:xfrm>
+            <a:off x="578903" y="1740162"/>
+            <a:ext cx="3541826" cy="3943527"/>
+          </a:xfrm>
+          <a:prstGeom prst="rect">
+            <a:avLst/>
+          </a:prstGeom>
+        </p:spPr>
+      </p:pic>
+      <p:pic>
+        <p:nvPicPr>
+          <p:cNvPr id="10" name="Picture 9">
+            <a:extLst>
+              <a:ext uri="{FF2B5EF4-FFF2-40B4-BE49-F238E27FC236}">
+                <a16:creationId xmlns:a16="http://schemas.microsoft.com/office/drawing/2014/main" id="{549ECA3C-EEDB-4CA5-B991-9DB5A17B1CF6}"/>
+              </a:ext>
+            </a:extLst>
+          </p:cNvPr>
+          <p:cNvPicPr>
+            <a:picLocks noChangeAspect="1"/>
+          </p:cNvPicPr>
+          <p:nvPr/>
+        </p:nvPicPr>
+        <p:blipFill>
+          <a:blip r:embed="rId4"/>
+          <a:stretch>
+            <a:fillRect/>
+          </a:stretch>
+        </p:blipFill>
+        <p:spPr>
+          <a:xfrm>
+            <a:off x="4635910" y="1751811"/>
+            <a:ext cx="3557586" cy="3943527"/>
+          </a:xfrm>
+          <a:prstGeom prst="rect">
+            <a:avLst/>
+          </a:prstGeom>
+        </p:spPr>
+      </p:pic>
+      <p:sp>
+        <p:nvSpPr>
+          <p:cNvPr id="11" name="TextBox 10">
+            <a:extLst>
+              <a:ext uri="{FF2B5EF4-FFF2-40B4-BE49-F238E27FC236}">
+                <a16:creationId xmlns:a16="http://schemas.microsoft.com/office/drawing/2014/main" id="{B3282774-76AA-4258-943F-0B19D10A19D7}"/>
+              </a:ext>
+            </a:extLst>
+          </p:cNvPr>
+          <p:cNvSpPr txBox="1"/>
+          <p:nvPr/>
+        </p:nvSpPr>
+        <p:spPr>
+          <a:xfrm>
+            <a:off x="2274476" y="2443195"/>
+            <a:ext cx="1477541" cy="276999"/>
+          </a:xfrm>
+          <a:prstGeom prst="rect">
+            <a:avLst/>
+          </a:prstGeom>
+          <a:noFill/>
+          <a:ln>
+            <a:solidFill>
+              <a:schemeClr val="bg1">
+                <a:lumMod val="65000"/>
+              </a:schemeClr>
+            </a:solidFill>
+          </a:ln>
+        </p:spPr>
+        <p:txBody>
+          <a:bodyPr wrap="square" rtlCol="0">
+            <a:spAutoFit/>
+          </a:bodyPr>
+          <a:lstStyle/>
+          <a:p>
+            <a:r>
+              <a:rPr lang="en-US" sz="1200" i="1" dirty="0">
+                <a:latin typeface="Calibri" panose="020F0502020204030204" pitchFamily="34" charset="0"/>
+                <a:cs typeface="Calibri" panose="020F0502020204030204" pitchFamily="34" charset="0"/>
+              </a:rPr>
+              <a:t>N = </a:t>
+            </a:r>
+            <a:r>
+              <a:rPr lang="en-US" sz="1200" dirty="0">
+                <a:latin typeface="Calibri" panose="020F0502020204030204" pitchFamily="34" charset="0"/>
+                <a:cs typeface="Calibri" panose="020F0502020204030204" pitchFamily="34" charset="0"/>
+              </a:rPr>
+              <a:t>947 (all doctors)</a:t>
+            </a:r>
+          </a:p>
+        </p:txBody>
+      </p:sp>
+      <p:sp>
+        <p:nvSpPr>
+          <p:cNvPr id="12" name="TextBox 11">
+            <a:extLst>
+              <a:ext uri="{FF2B5EF4-FFF2-40B4-BE49-F238E27FC236}">
+                <a16:creationId xmlns:a16="http://schemas.microsoft.com/office/drawing/2014/main" id="{C004B274-2401-4F88-8E6A-8B27FE091D83}"/>
+              </a:ext>
+            </a:extLst>
+          </p:cNvPr>
+          <p:cNvSpPr txBox="1"/>
+          <p:nvPr/>
+        </p:nvSpPr>
+        <p:spPr>
+          <a:xfrm>
+            <a:off x="6010739" y="3467935"/>
+            <a:ext cx="1112734" cy="830997"/>
+          </a:xfrm>
+          <a:prstGeom prst="rect">
+            <a:avLst/>
+          </a:prstGeom>
+          <a:noFill/>
+          <a:ln>
+            <a:solidFill>
+              <a:schemeClr val="bg1">
+                <a:lumMod val="65000"/>
+              </a:schemeClr>
+            </a:solidFill>
+          </a:ln>
+        </p:spPr>
+        <p:txBody>
+          <a:bodyPr wrap="square" rtlCol="0">
+            <a:spAutoFit/>
+          </a:bodyPr>
+          <a:lstStyle/>
+          <a:p>
+            <a:r>
+              <a:rPr lang="en-US" sz="1200" i="1" dirty="0">
+                <a:latin typeface="Calibri" panose="020F0502020204030204" pitchFamily="34" charset="0"/>
+                <a:cs typeface="Calibri" panose="020F0502020204030204" pitchFamily="34" charset="0"/>
+              </a:rPr>
+              <a:t>N = </a:t>
+            </a:r>
+            <a:r>
+              <a:rPr lang="en-US" sz="1200" dirty="0">
+                <a:latin typeface="Calibri" panose="020F0502020204030204" pitchFamily="34" charset="0"/>
+                <a:cs typeface="Calibri" panose="020F0502020204030204" pitchFamily="34" charset="0"/>
+              </a:rPr>
+              <a:t>404 </a:t>
+            </a:r>
+          </a:p>
+          <a:p>
+            <a:r>
+              <a:rPr lang="en-US" sz="1200" dirty="0">
+                <a:latin typeface="Calibri" panose="020F0502020204030204" pitchFamily="34" charset="0"/>
+                <a:cs typeface="Calibri" panose="020F0502020204030204" pitchFamily="34" charset="0"/>
+              </a:rPr>
+              <a:t>(has gender info, and ≥ 5 reviews)</a:t>
+            </a:r>
+          </a:p>
+        </p:txBody>
+      </p:sp>
+      <p:sp>
+        <p:nvSpPr>
+          <p:cNvPr id="13" name="Rectangle 12">
+            <a:extLst>
+              <a:ext uri="{FF2B5EF4-FFF2-40B4-BE49-F238E27FC236}">
+                <a16:creationId xmlns:a16="http://schemas.microsoft.com/office/drawing/2014/main" id="{1F275EF3-B34B-425E-A630-470285785BB0}"/>
+              </a:ext>
+            </a:extLst>
+          </p:cNvPr>
+          <p:cNvSpPr/>
+          <p:nvPr/>
+        </p:nvSpPr>
+        <p:spPr bwMode="auto">
+          <a:xfrm>
+            <a:off x="1189703" y="5798799"/>
+            <a:ext cx="6784258" cy="702405"/>
+          </a:xfrm>
+          <a:prstGeom prst="rect">
+            <a:avLst/>
+          </a:prstGeom>
+          <a:gradFill rotWithShape="1">
+            <a:gsLst>
+              <a:gs pos="0">
+                <a:srgbClr val="FDD4AB">
+                  <a:tint val="50000"/>
+                  <a:satMod val="300000"/>
+                </a:srgbClr>
+              </a:gs>
+              <a:gs pos="35000">
+                <a:srgbClr val="FDD4AB">
+                  <a:tint val="37000"/>
+                  <a:satMod val="300000"/>
+                </a:srgbClr>
+              </a:gs>
+              <a:gs pos="100000">
+                <a:srgbClr val="FDD4AB">
+                  <a:tint val="15000"/>
+                  <a:satMod val="350000"/>
+                </a:srgbClr>
+              </a:gs>
+            </a:gsLst>
+            <a:lin ang="16200000" scaled="1"/>
+          </a:gradFill>
+          <a:ln w="9525" cap="flat" cmpd="sng" algn="ctr">
+            <a:solidFill>
+              <a:srgbClr val="FDD4AB">
+                <a:shade val="95000"/>
+                <a:satMod val="105000"/>
+              </a:srgbClr>
+            </a:solidFill>
+            <a:prstDash val="solid"/>
+          </a:ln>
+          <a:effectLst>
+            <a:outerShdw blurRad="40000" dist="20000" dir="5400000" rotWithShape="0">
+              <a:srgbClr val="000000">
+                <a:alpha val="38000"/>
+              </a:srgbClr>
+            </a:outerShdw>
+          </a:effectLst>
+        </p:spPr>
+        <p:txBody>
+          <a:bodyPr wrap="square" tIns="0" bIns="0" rtlCol="0">
+            <a:noAutofit/>
+          </a:bodyPr>
+          <a:lstStyle/>
+          <a:p>
+            <a:pPr marL="111125" lvl="0" indent="-111125">
+              <a:lnSpc>
+                <a:spcPct val="150000"/>
+              </a:lnSpc>
+              <a:buClr>
+                <a:srgbClr val="EC8026"/>
+              </a:buClr>
+              <a:buSzPct val="130000"/>
+              <a:buFont typeface="Arial" pitchFamily="34" charset="0"/>
+              <a:buChar char="•"/>
+              <a:defRPr/>
+            </a:pPr>
+            <a:r>
+              <a:rPr lang="en-US" sz="1300" kern="0" dirty="0">
+                <a:solidFill>
+                  <a:srgbClr val="000000"/>
+                </a:solidFill>
+                <a:ea typeface="ＭＳ Ｐゴシック" charset="-128"/>
+              </a:rPr>
+              <a:t>Female doctors tend to have fewer reviews than male doctors (p-</a:t>
+            </a:r>
+            <a:r>
+              <a:rPr lang="en-US" sz="1300" kern="0" dirty="0" err="1">
+                <a:solidFill>
+                  <a:srgbClr val="000000"/>
+                </a:solidFill>
+                <a:ea typeface="ＭＳ Ｐゴシック" charset="-128"/>
+              </a:rPr>
+              <a:t>val</a:t>
+            </a:r>
+            <a:r>
+              <a:rPr lang="en-US" sz="1300" kern="0" dirty="0">
+                <a:solidFill>
+                  <a:srgbClr val="000000"/>
+                </a:solidFill>
+                <a:ea typeface="ＭＳ Ｐゴシック" charset="-128"/>
+              </a:rPr>
+              <a:t> = 0.0002) </a:t>
+            </a:r>
+          </a:p>
+          <a:p>
+            <a:pPr marL="111125" lvl="0" indent="-111125">
+              <a:lnSpc>
+                <a:spcPct val="150000"/>
+              </a:lnSpc>
+              <a:buClr>
+                <a:srgbClr val="EC8026"/>
+              </a:buClr>
+              <a:buSzPct val="130000"/>
+              <a:buFont typeface="Arial" pitchFamily="34" charset="0"/>
+              <a:buChar char="•"/>
+              <a:defRPr/>
+            </a:pPr>
+            <a:r>
+              <a:rPr lang="en-US" sz="1300" kern="0" dirty="0">
+                <a:solidFill>
+                  <a:srgbClr val="000000"/>
+                </a:solidFill>
+                <a:ea typeface="ＭＳ Ｐゴシック" charset="-128"/>
+              </a:rPr>
+              <a:t>The doctors with &gt; 25 reviews are almost all male</a:t>
+            </a:r>
+          </a:p>
+        </p:txBody>
+      </p:sp>
+    </p:spTree>
+    <p:extLst>
+      <p:ext uri="{BB962C8B-B14F-4D97-AF65-F5344CB8AC3E}">
+        <p14:creationId xmlns:p14="http://schemas.microsoft.com/office/powerpoint/2010/main" val="3877481786"/>
+      </p:ext>
+    </p:extLst>
+  </p:cSld>
+  <p:clrMapOvr>
+    <a:masterClrMapping/>
+  </p:clrMapOvr>
+</p:sld>
+</file>
+
 <file path=ppt/slides/slide16.xml><?xml version="1.0" encoding="utf-8"?>
 <p:sld xmlns:a="http://schemas.openxmlformats.org/drawingml/2006/main" xmlns:r="http://schemas.openxmlformats.org/officeDocument/2006/relationships" xmlns:p="http://schemas.openxmlformats.org/presentationml/2006/main">
   <p:cSld>
@@ -10854,7 +10878,7 @@
           <a:p>
             <a:r>
               <a:rPr lang="en-US" sz="1800" dirty="0"/>
-              <a:t>Physicians with different length of time in practice are perceived similarly by patients in terms of bedside matter and quality of interaction</a:t>
+              <a:t>GI doctors in NYC metro with different length of time in practice are perceived similarly by patients in terms of bedside matter and quality of interaction</a:t>
             </a:r>
           </a:p>
           <a:p>
@@ -11204,6 +11228,105 @@
           </a:graphicData>
         </a:graphic>
       </p:graphicFrame>
+      <p:sp>
+        <p:nvSpPr>
+          <p:cNvPr id="5" name="Comment1">
+            <a:extLst>
+              <a:ext uri="{FF2B5EF4-FFF2-40B4-BE49-F238E27FC236}">
+                <a16:creationId xmlns:a16="http://schemas.microsoft.com/office/drawing/2014/main" id="{98CE6E6F-0202-4E65-A7FA-B47591EE2B3B}"/>
+              </a:ext>
+            </a:extLst>
+          </p:cNvPr>
+          <p:cNvSpPr/>
+          <p:nvPr/>
+        </p:nvSpPr>
+        <p:spPr>
+          <a:xfrm>
+            <a:off x="4930877" y="5783565"/>
+            <a:ext cx="3151547" cy="715089"/>
+          </a:xfrm>
+          <a:prstGeom prst="wedgeRoundRectCallout">
+            <a:avLst>
+              <a:gd name="adj1" fmla="val -21370"/>
+              <a:gd name="adj2" fmla="val -81827"/>
+              <a:gd name="adj3" fmla="val 16667"/>
+            </a:avLst>
+          </a:prstGeom>
+          <a:gradFill rotWithShape="1">
+            <a:gsLst>
+              <a:gs pos="0">
+                <a:srgbClr val="FCAF17">
+                  <a:tint val="50000"/>
+                  <a:satMod val="300000"/>
+                </a:srgbClr>
+              </a:gs>
+              <a:gs pos="35000">
+                <a:srgbClr val="FCAF17">
+                  <a:tint val="37000"/>
+                  <a:satMod val="300000"/>
+                </a:srgbClr>
+              </a:gs>
+              <a:gs pos="100000">
+                <a:srgbClr val="FCAF17">
+                  <a:tint val="15000"/>
+                  <a:satMod val="350000"/>
+                </a:srgbClr>
+              </a:gs>
+            </a:gsLst>
+            <a:lin ang="16200000" scaled="1"/>
+          </a:gradFill>
+          <a:ln w="9525" cap="flat" cmpd="sng" algn="ctr">
+            <a:solidFill>
+              <a:srgbClr val="FCAF17">
+                <a:shade val="95000"/>
+                <a:satMod val="105000"/>
+              </a:srgbClr>
+            </a:solidFill>
+            <a:prstDash val="solid"/>
+          </a:ln>
+          <a:effectLst>
+            <a:outerShdw blurRad="40000" dist="20000" dir="5400000" rotWithShape="0">
+              <a:srgbClr val="000000">
+                <a:alpha val="38000"/>
+              </a:srgbClr>
+            </a:outerShdw>
+          </a:effectLst>
+        </p:spPr>
+        <p:txBody>
+          <a:bodyPr wrap="square" lIns="0" tIns="0" rIns="0" bIns="0">
+            <a:spAutoFit/>
+          </a:bodyPr>
+          <a:lstStyle/>
+          <a:p>
+            <a:pPr marL="109538" marR="0" lvl="0" indent="0" defTabSz="914400" eaLnBrk="1" fontAlgn="auto" latinLnBrk="0" hangingPunct="1">
+              <a:lnSpc>
+                <a:spcPct val="100000"/>
+              </a:lnSpc>
+              <a:spcBef>
+                <a:spcPts val="0"/>
+              </a:spcBef>
+              <a:spcAft>
+                <a:spcPts val="0"/>
+              </a:spcAft>
+              <a:buClrTx/>
+              <a:buSzTx/>
+              <a:buFontTx/>
+              <a:buNone/>
+              <a:tabLst/>
+              <a:defRPr/>
+            </a:pPr>
+            <a:r>
+              <a:rPr lang="en-US" sz="1400" kern="0" dirty="0">
+                <a:solidFill>
+                  <a:srgbClr val="000000"/>
+                </a:solidFill>
+                <a:latin typeface="Arial"/>
+              </a:rPr>
+              <a:t>Trends from analysis of cardiologists in NYC metro very similar to those from the GI doctor analysis</a:t>
+            </a:r>
+          </a:p>
+        </p:txBody>
+      </p:sp>
     </p:spTree>
     <p:extLst>
       <p:ext uri="{BB962C8B-B14F-4D97-AF65-F5344CB8AC3E}">

</xml_diff>